<commit_message>
Changed Style of Presentation
</commit_message>
<xml_diff>
--- a/Präsentation/Röhrenverstärker.pptx
+++ b/Präsentation/Röhrenverstärker.pptx
@@ -116,6 +116,11 @@
       </a:defRPr>
     </a:lvl9pPr>
   </p:defaultTextStyle>
+  <p:extLst>
+    <p:ext uri="{EFAFB233-063F-42B5-8137-9DF3F51BA10A}">
+      <p15:sldGuideLst xmlns:p15="http://schemas.microsoft.com/office/powerpoint/2012/main"/>
+    </p:ext>
+  </p:extLst>
 </p:presentation>
 </file>
 
@@ -8883,7 +8888,7 @@
             <a:fld id="{B61BEF0D-F0BB-DE4B-95CE-6DB70DBA9567}" type="datetimeFigureOut">
               <a:rPr lang="en-US" dirty="0"/>
               <a:pPr/>
-              <a:t>1/6/2019</a:t>
+              <a:t>1/21/2019</a:t>
             </a:fld>
             <a:endParaRPr lang="en-US" dirty="0"/>
           </a:p>
@@ -8937,13 +8942,13 @@
   <p:clrMapOvr>
     <a:masterClrMapping/>
   </p:clrMapOvr>
-  <mc:AlternateContent xmlns:mc="http://schemas.openxmlformats.org/markup-compatibility/2006">
-    <mc:Choice xmlns:p159="http://schemas.microsoft.com/office/powerpoint/2015/09/main" Requires="p159">
+  <mc:AlternateContent xmlns:mc="http://schemas.openxmlformats.org/markup-compatibility/2006" xmlns:p159="http://schemas.microsoft.com/office/powerpoint/2015/09/main">
+    <mc:Choice Requires="p159">
       <p:transition spd="slow">
         <p159:morph option="byObject"/>
       </p:transition>
     </mc:Choice>
-    <mc:Fallback>
+    <mc:Fallback xmlns="">
       <p:transition spd="slow">
         <p:fade/>
       </p:transition>
@@ -9143,7 +9148,7 @@
             <a:fld id="{B61BEF0D-F0BB-DE4B-95CE-6DB70DBA9567}" type="datetimeFigureOut">
               <a:rPr lang="en-US" dirty="0"/>
               <a:pPr/>
-              <a:t>1/6/2019</a:t>
+              <a:t>1/21/2019</a:t>
             </a:fld>
             <a:endParaRPr lang="en-US" dirty="0"/>
           </a:p>
@@ -9197,13 +9202,13 @@
   <p:clrMapOvr>
     <a:masterClrMapping/>
   </p:clrMapOvr>
-  <mc:AlternateContent xmlns:mc="http://schemas.openxmlformats.org/markup-compatibility/2006">
-    <mc:Choice xmlns:p159="http://schemas.microsoft.com/office/powerpoint/2015/09/main" Requires="p159">
+  <mc:AlternateContent xmlns:mc="http://schemas.openxmlformats.org/markup-compatibility/2006" xmlns:p159="http://schemas.microsoft.com/office/powerpoint/2015/09/main">
+    <mc:Choice Requires="p159">
       <p:transition spd="slow">
         <p159:morph option="byObject"/>
       </p:transition>
     </mc:Choice>
-    <mc:Fallback>
+    <mc:Fallback xmlns="">
       <p:transition spd="slow">
         <p:fade/>
       </p:transition>
@@ -9466,7 +9471,7 @@
             <a:fld id="{B61BEF0D-F0BB-DE4B-95CE-6DB70DBA9567}" type="datetimeFigureOut">
               <a:rPr lang="en-US" dirty="0"/>
               <a:pPr/>
-              <a:t>1/6/2019</a:t>
+              <a:t>1/21/2019</a:t>
             </a:fld>
             <a:endParaRPr lang="en-US" dirty="0"/>
           </a:p>
@@ -9602,13 +9607,13 @@
   <p:clrMapOvr>
     <a:masterClrMapping/>
   </p:clrMapOvr>
-  <mc:AlternateContent xmlns:mc="http://schemas.openxmlformats.org/markup-compatibility/2006">
-    <mc:Choice xmlns:p159="http://schemas.microsoft.com/office/powerpoint/2015/09/main" Requires="p159">
+  <mc:AlternateContent xmlns:mc="http://schemas.openxmlformats.org/markup-compatibility/2006" xmlns:p159="http://schemas.microsoft.com/office/powerpoint/2015/09/main">
+    <mc:Choice Requires="p159">
       <p:transition spd="slow">
         <p159:morph option="byObject"/>
       </p:transition>
     </mc:Choice>
-    <mc:Fallback>
+    <mc:Fallback xmlns="">
       <p:transition spd="slow">
         <p:fade/>
       </p:transition>
@@ -9808,7 +9813,7 @@
             <a:fld id="{B61BEF0D-F0BB-DE4B-95CE-6DB70DBA9567}" type="datetimeFigureOut">
               <a:rPr lang="en-US" dirty="0"/>
               <a:pPr/>
-              <a:t>1/6/2019</a:t>
+              <a:t>1/21/2019</a:t>
             </a:fld>
             <a:endParaRPr lang="en-US" dirty="0"/>
           </a:p>
@@ -9862,13 +9867,13 @@
   <p:clrMapOvr>
     <a:masterClrMapping/>
   </p:clrMapOvr>
-  <mc:AlternateContent xmlns:mc="http://schemas.openxmlformats.org/markup-compatibility/2006">
-    <mc:Choice xmlns:p159="http://schemas.microsoft.com/office/powerpoint/2015/09/main" Requires="p159">
+  <mc:AlternateContent xmlns:mc="http://schemas.openxmlformats.org/markup-compatibility/2006" xmlns:p159="http://schemas.microsoft.com/office/powerpoint/2015/09/main">
+    <mc:Choice Requires="p159">
       <p:transition spd="slow">
         <p159:morph option="byObject"/>
       </p:transition>
     </mc:Choice>
-    <mc:Fallback>
+    <mc:Fallback xmlns="">
       <p:transition spd="slow">
         <p:fade/>
       </p:transition>
@@ -10131,7 +10136,7 @@
             <a:fld id="{B61BEF0D-F0BB-DE4B-95CE-6DB70DBA9567}" type="datetimeFigureOut">
               <a:rPr lang="en-US" dirty="0"/>
               <a:pPr/>
-              <a:t>1/6/2019</a:t>
+              <a:t>1/21/2019</a:t>
             </a:fld>
             <a:endParaRPr lang="en-US" dirty="0"/>
           </a:p>
@@ -10267,13 +10272,13 @@
   <p:clrMapOvr>
     <a:masterClrMapping/>
   </p:clrMapOvr>
-  <mc:AlternateContent xmlns:mc="http://schemas.openxmlformats.org/markup-compatibility/2006">
-    <mc:Choice xmlns:p159="http://schemas.microsoft.com/office/powerpoint/2015/09/main" Requires="p159">
+  <mc:AlternateContent xmlns:mc="http://schemas.openxmlformats.org/markup-compatibility/2006" xmlns:p159="http://schemas.microsoft.com/office/powerpoint/2015/09/main">
+    <mc:Choice Requires="p159">
       <p:transition spd="slow">
         <p159:morph option="byObject"/>
       </p:transition>
     </mc:Choice>
-    <mc:Fallback>
+    <mc:Fallback xmlns="">
       <p:transition spd="slow">
         <p:fade/>
       </p:transition>
@@ -10533,7 +10538,7 @@
             <a:fld id="{B61BEF0D-F0BB-DE4B-95CE-6DB70DBA9567}" type="datetimeFigureOut">
               <a:rPr lang="en-US" dirty="0"/>
               <a:pPr/>
-              <a:t>1/6/2019</a:t>
+              <a:t>1/21/2019</a:t>
             </a:fld>
             <a:endParaRPr lang="en-US" dirty="0"/>
           </a:p>
@@ -10587,13 +10592,13 @@
   <p:clrMapOvr>
     <a:masterClrMapping/>
   </p:clrMapOvr>
-  <mc:AlternateContent xmlns:mc="http://schemas.openxmlformats.org/markup-compatibility/2006">
-    <mc:Choice xmlns:p159="http://schemas.microsoft.com/office/powerpoint/2015/09/main" Requires="p159">
+  <mc:AlternateContent xmlns:mc="http://schemas.openxmlformats.org/markup-compatibility/2006" xmlns:p159="http://schemas.microsoft.com/office/powerpoint/2015/09/main">
+    <mc:Choice Requires="p159">
       <p:transition spd="slow">
         <p159:morph option="byObject"/>
       </p:transition>
     </mc:Choice>
-    <mc:Fallback>
+    <mc:Fallback xmlns="">
       <p:transition spd="slow">
         <p:fade/>
       </p:transition>
@@ -10711,7 +10716,7 @@
           <a:p>
             <a:fld id="{55C6B4A9-1611-4792-9094-5F34BCA07E0B}" type="datetimeFigureOut">
               <a:rPr lang="en-US" dirty="0"/>
-              <a:t>1/6/2019</a:t>
+              <a:t>1/21/2019</a:t>
             </a:fld>
             <a:endParaRPr lang="en-US" dirty="0"/>
           </a:p>
@@ -10764,13 +10769,13 @@
   <p:clrMapOvr>
     <a:masterClrMapping/>
   </p:clrMapOvr>
-  <mc:AlternateContent xmlns:mc="http://schemas.openxmlformats.org/markup-compatibility/2006">
-    <mc:Choice xmlns:p159="http://schemas.microsoft.com/office/powerpoint/2015/09/main" Requires="p159">
+  <mc:AlternateContent xmlns:mc="http://schemas.openxmlformats.org/markup-compatibility/2006" xmlns:p159="http://schemas.microsoft.com/office/powerpoint/2015/09/main">
+    <mc:Choice Requires="p159">
       <p:transition spd="slow">
         <p159:morph option="byObject"/>
       </p:transition>
     </mc:Choice>
-    <mc:Fallback>
+    <mc:Fallback xmlns="">
       <p:transition spd="slow">
         <p:fade/>
       </p:transition>
@@ -10899,7 +10904,7 @@
             <a:fld id="{B61BEF0D-F0BB-DE4B-95CE-6DB70DBA9567}" type="datetimeFigureOut">
               <a:rPr lang="en-US" dirty="0"/>
               <a:pPr/>
-              <a:t>1/6/2019</a:t>
+              <a:t>1/21/2019</a:t>
             </a:fld>
             <a:endParaRPr lang="en-US" dirty="0"/>
           </a:p>
@@ -10953,13 +10958,13 @@
   <p:clrMapOvr>
     <a:masterClrMapping/>
   </p:clrMapOvr>
-  <mc:AlternateContent xmlns:mc="http://schemas.openxmlformats.org/markup-compatibility/2006">
-    <mc:Choice xmlns:p159="http://schemas.microsoft.com/office/powerpoint/2015/09/main" Requires="p159">
+  <mc:AlternateContent xmlns:mc="http://schemas.openxmlformats.org/markup-compatibility/2006" xmlns:p159="http://schemas.microsoft.com/office/powerpoint/2015/09/main">
+    <mc:Choice Requires="p159">
       <p:transition spd="slow">
         <p159:morph option="byObject"/>
       </p:transition>
     </mc:Choice>
-    <mc:Fallback>
+    <mc:Fallback xmlns="">
       <p:transition spd="slow">
         <p:fade/>
       </p:transition>
@@ -11077,7 +11082,7 @@
           <a:p>
             <a:fld id="{42A54C80-263E-416B-A8E0-580EDEADCBDC}" type="datetimeFigureOut">
               <a:rPr lang="en-US" dirty="0"/>
-              <a:t>1/6/2019</a:t>
+              <a:t>1/21/2019</a:t>
             </a:fld>
             <a:endParaRPr lang="en-US" dirty="0"/>
           </a:p>
@@ -11130,13 +11135,13 @@
   <p:clrMapOvr>
     <a:masterClrMapping/>
   </p:clrMapOvr>
-  <mc:AlternateContent xmlns:mc="http://schemas.openxmlformats.org/markup-compatibility/2006">
-    <mc:Choice xmlns:p159="http://schemas.microsoft.com/office/powerpoint/2015/09/main" Requires="p159">
+  <mc:AlternateContent xmlns:mc="http://schemas.openxmlformats.org/markup-compatibility/2006" xmlns:p159="http://schemas.microsoft.com/office/powerpoint/2015/09/main">
+    <mc:Choice Requires="p159">
       <p:transition spd="slow">
         <p159:morph option="byObject"/>
       </p:transition>
     </mc:Choice>
-    <mc:Fallback>
+    <mc:Fallback xmlns="">
       <p:transition spd="slow">
         <p:fade/>
       </p:transition>
@@ -11332,7 +11337,7 @@
             <a:fld id="{B61BEF0D-F0BB-DE4B-95CE-6DB70DBA9567}" type="datetimeFigureOut">
               <a:rPr lang="en-US" dirty="0"/>
               <a:pPr/>
-              <a:t>1/6/2019</a:t>
+              <a:t>1/21/2019</a:t>
             </a:fld>
             <a:endParaRPr lang="en-US" dirty="0"/>
           </a:p>
@@ -11386,13 +11391,13 @@
   <p:clrMapOvr>
     <a:masterClrMapping/>
   </p:clrMapOvr>
-  <mc:AlternateContent xmlns:mc="http://schemas.openxmlformats.org/markup-compatibility/2006">
-    <mc:Choice xmlns:p159="http://schemas.microsoft.com/office/powerpoint/2015/09/main" Requires="p159">
+  <mc:AlternateContent xmlns:mc="http://schemas.openxmlformats.org/markup-compatibility/2006" xmlns:p159="http://schemas.microsoft.com/office/powerpoint/2015/09/main">
+    <mc:Choice Requires="p159">
       <p:transition spd="slow">
         <p159:morph option="byObject"/>
       </p:transition>
     </mc:Choice>
-    <mc:Fallback>
+    <mc:Fallback xmlns="">
       <p:transition spd="slow">
         <p:fade/>
       </p:transition>
@@ -11572,7 +11577,7 @@
           <a:p>
             <a:fld id="{42A54C80-263E-416B-A8E0-580EDEADCBDC}" type="datetimeFigureOut">
               <a:rPr lang="en-US" dirty="0"/>
-              <a:t>1/6/2019</a:t>
+              <a:t>1/21/2019</a:t>
             </a:fld>
             <a:endParaRPr lang="en-US" dirty="0"/>
           </a:p>
@@ -11625,13 +11630,13 @@
   <p:clrMapOvr>
     <a:masterClrMapping/>
   </p:clrMapOvr>
-  <mc:AlternateContent xmlns:mc="http://schemas.openxmlformats.org/markup-compatibility/2006">
-    <mc:Choice xmlns:p159="http://schemas.microsoft.com/office/powerpoint/2015/09/main" Requires="p159">
+  <mc:AlternateContent xmlns:mc="http://schemas.openxmlformats.org/markup-compatibility/2006" xmlns:p159="http://schemas.microsoft.com/office/powerpoint/2015/09/main">
+    <mc:Choice Requires="p159">
       <p:transition spd="slow">
         <p159:morph option="byObject"/>
       </p:transition>
     </mc:Choice>
-    <mc:Fallback>
+    <mc:Fallback xmlns="">
       <p:transition spd="slow">
         <p:fade/>
       </p:transition>
@@ -11954,7 +11959,7 @@
             <a:fld id="{B61BEF0D-F0BB-DE4B-95CE-6DB70DBA9567}" type="datetimeFigureOut">
               <a:rPr lang="en-US" dirty="0"/>
               <a:pPr/>
-              <a:t>1/6/2019</a:t>
+              <a:t>1/21/2019</a:t>
             </a:fld>
             <a:endParaRPr lang="en-US" dirty="0"/>
           </a:p>
@@ -12008,13 +12013,13 @@
   <p:clrMapOvr>
     <a:masterClrMapping/>
   </p:clrMapOvr>
-  <mc:AlternateContent xmlns:mc="http://schemas.openxmlformats.org/markup-compatibility/2006">
-    <mc:Choice xmlns:p159="http://schemas.microsoft.com/office/powerpoint/2015/09/main" Requires="p159">
+  <mc:AlternateContent xmlns:mc="http://schemas.openxmlformats.org/markup-compatibility/2006" xmlns:p159="http://schemas.microsoft.com/office/powerpoint/2015/09/main">
+    <mc:Choice Requires="p159">
       <p:transition spd="slow">
         <p159:morph option="byObject"/>
       </p:transition>
     </mc:Choice>
-    <mc:Fallback>
+    <mc:Fallback xmlns="">
       <p:transition spd="slow">
         <p:fade/>
       </p:transition>
@@ -12086,7 +12091,7 @@
             <a:fld id="{B61BEF0D-F0BB-DE4B-95CE-6DB70DBA9567}" type="datetimeFigureOut">
               <a:rPr lang="en-US" dirty="0"/>
               <a:pPr/>
-              <a:t>1/6/2019</a:t>
+              <a:t>1/21/2019</a:t>
             </a:fld>
             <a:endParaRPr lang="en-US" dirty="0"/>
           </a:p>
@@ -12140,13 +12145,13 @@
   <p:clrMapOvr>
     <a:masterClrMapping/>
   </p:clrMapOvr>
-  <mc:AlternateContent xmlns:mc="http://schemas.openxmlformats.org/markup-compatibility/2006">
-    <mc:Choice xmlns:p159="http://schemas.microsoft.com/office/powerpoint/2015/09/main" Requires="p159">
+  <mc:AlternateContent xmlns:mc="http://schemas.openxmlformats.org/markup-compatibility/2006" xmlns:p159="http://schemas.microsoft.com/office/powerpoint/2015/09/main">
+    <mc:Choice Requires="p159">
       <p:transition spd="slow">
         <p159:morph option="byObject"/>
       </p:transition>
     </mc:Choice>
-    <mc:Fallback>
+    <mc:Fallback xmlns="">
       <p:transition spd="slow">
         <p:fade/>
       </p:transition>
@@ -12190,7 +12195,7 @@
             <a:fld id="{B61BEF0D-F0BB-DE4B-95CE-6DB70DBA9567}" type="datetimeFigureOut">
               <a:rPr lang="en-US" dirty="0"/>
               <a:pPr/>
-              <a:t>1/6/2019</a:t>
+              <a:t>1/21/2019</a:t>
             </a:fld>
             <a:endParaRPr lang="en-US" dirty="0"/>
           </a:p>
@@ -12244,13 +12249,13 @@
   <p:clrMapOvr>
     <a:masterClrMapping/>
   </p:clrMapOvr>
-  <mc:AlternateContent xmlns:mc="http://schemas.openxmlformats.org/markup-compatibility/2006">
-    <mc:Choice xmlns:p159="http://schemas.microsoft.com/office/powerpoint/2015/09/main" Requires="p159">
+  <mc:AlternateContent xmlns:mc="http://schemas.openxmlformats.org/markup-compatibility/2006" xmlns:p159="http://schemas.microsoft.com/office/powerpoint/2015/09/main">
+    <mc:Choice Requires="p159">
       <p:transition spd="slow">
         <p159:morph option="byObject"/>
       </p:transition>
     </mc:Choice>
-    <mc:Fallback>
+    <mc:Fallback xmlns="">
       <p:transition spd="slow">
         <p:fade/>
       </p:transition>
@@ -12453,7 +12458,7 @@
           <a:p>
             <a:fld id="{42A54C80-263E-416B-A8E0-580EDEADCBDC}" type="datetimeFigureOut">
               <a:rPr lang="en-US" dirty="0"/>
-              <a:t>1/6/2019</a:t>
+              <a:t>1/21/2019</a:t>
             </a:fld>
             <a:endParaRPr lang="en-US" dirty="0"/>
           </a:p>
@@ -12506,13 +12511,13 @@
   <p:clrMapOvr>
     <a:masterClrMapping/>
   </p:clrMapOvr>
-  <mc:AlternateContent xmlns:mc="http://schemas.openxmlformats.org/markup-compatibility/2006">
-    <mc:Choice xmlns:p159="http://schemas.microsoft.com/office/powerpoint/2015/09/main" Requires="p159">
+  <mc:AlternateContent xmlns:mc="http://schemas.openxmlformats.org/markup-compatibility/2006" xmlns:p159="http://schemas.microsoft.com/office/powerpoint/2015/09/main">
+    <mc:Choice Requires="p159">
       <p:transition spd="slow">
         <p159:morph option="byObject"/>
       </p:transition>
     </mc:Choice>
-    <mc:Fallback>
+    <mc:Fallback xmlns="">
       <p:transition spd="slow">
         <p:fade/>
       </p:transition>
@@ -12767,7 +12772,7 @@
             <a:fld id="{B61BEF0D-F0BB-DE4B-95CE-6DB70DBA9567}" type="datetimeFigureOut">
               <a:rPr lang="en-US" dirty="0"/>
               <a:pPr/>
-              <a:t>1/6/2019</a:t>
+              <a:t>1/21/2019</a:t>
             </a:fld>
             <a:endParaRPr lang="en-US" dirty="0"/>
           </a:p>
@@ -12778,13 +12783,13 @@
   <p:clrMapOvr>
     <a:masterClrMapping/>
   </p:clrMapOvr>
-  <mc:AlternateContent xmlns:mc="http://schemas.openxmlformats.org/markup-compatibility/2006">
-    <mc:Choice xmlns:p159="http://schemas.microsoft.com/office/powerpoint/2015/09/main" Requires="p159">
+  <mc:AlternateContent xmlns:mc="http://schemas.openxmlformats.org/markup-compatibility/2006" xmlns:p159="http://schemas.microsoft.com/office/powerpoint/2015/09/main">
+    <mc:Choice Requires="p159">
       <p:transition spd="slow">
         <p159:morph option="byObject"/>
       </p:transition>
     </mc:Choice>
-    <mc:Fallback>
+    <mc:Fallback xmlns="">
       <p:transition spd="slow">
         <p:fade/>
       </p:transition>
@@ -13477,7 +13482,7 @@
             <a:fld id="{B61BEF0D-F0BB-DE4B-95CE-6DB70DBA9567}" type="datetimeFigureOut">
               <a:rPr lang="en-US" dirty="0"/>
               <a:pPr/>
-              <a:t>1/6/2019</a:t>
+              <a:t>1/21/2019</a:t>
             </a:fld>
             <a:endParaRPr lang="en-US" dirty="0"/>
           </a:p>
@@ -13581,13 +13586,13 @@
     <p:sldLayoutId id="2147483668" r:id="rId15"/>
     <p:sldLayoutId id="2147483659" r:id="rId16"/>
   </p:sldLayoutIdLst>
-  <mc:AlternateContent xmlns:mc="http://schemas.openxmlformats.org/markup-compatibility/2006">
-    <mc:Choice xmlns:p159="http://schemas.microsoft.com/office/powerpoint/2015/09/main" Requires="p159">
+  <mc:AlternateContent xmlns:mc="http://schemas.openxmlformats.org/markup-compatibility/2006" xmlns:p159="http://schemas.microsoft.com/office/powerpoint/2015/09/main">
+    <mc:Choice Requires="p159">
       <p:transition spd="slow">
         <p159:morph option="byObject"/>
       </p:transition>
     </mc:Choice>
-    <mc:Fallback>
+    <mc:Fallback xmlns="">
       <p:transition spd="slow">
         <p:fade/>
       </p:transition>
@@ -14083,13 +14088,13 @@
   <p:clrMapOvr>
     <a:masterClrMapping/>
   </p:clrMapOvr>
-  <mc:AlternateContent xmlns:mc="http://schemas.openxmlformats.org/markup-compatibility/2006">
-    <mc:Choice xmlns:p159="http://schemas.microsoft.com/office/powerpoint/2015/09/main" Requires="p159">
+  <mc:AlternateContent xmlns:mc="http://schemas.openxmlformats.org/markup-compatibility/2006" xmlns:p159="http://schemas.microsoft.com/office/powerpoint/2015/09/main">
+    <mc:Choice Requires="p159">
       <p:transition spd="slow">
         <p159:morph option="byObject"/>
       </p:transition>
     </mc:Choice>
-    <mc:Fallback>
+    <mc:Fallback xmlns="">
       <p:transition spd="slow">
         <p:fade/>
       </p:transition>
@@ -14185,13 +14190,13 @@
   <p:clrMapOvr>
     <a:masterClrMapping/>
   </p:clrMapOvr>
-  <mc:AlternateContent xmlns:mc="http://schemas.openxmlformats.org/markup-compatibility/2006">
-    <mc:Choice xmlns:p159="http://schemas.microsoft.com/office/powerpoint/2015/09/main" Requires="p159">
+  <mc:AlternateContent xmlns:mc="http://schemas.openxmlformats.org/markup-compatibility/2006" xmlns:p159="http://schemas.microsoft.com/office/powerpoint/2015/09/main">
+    <mc:Choice Requires="p159">
       <p:transition spd="slow">
         <p159:morph option="byObject"/>
       </p:transition>
     </mc:Choice>
-    <mc:Fallback>
+    <mc:Fallback xmlns="">
       <p:transition spd="slow">
         <p:fade/>
       </p:transition>
@@ -14233,7 +14238,12 @@
             <p:ph type="title"/>
           </p:nvPr>
         </p:nvSpPr>
-        <p:spPr/>
+        <p:spPr>
+          <a:xfrm>
+            <a:off x="677334" y="609600"/>
+            <a:ext cx="3641623" cy="5646722"/>
+          </a:xfrm>
+        </p:spPr>
         <p:txBody>
           <a:bodyPr/>
           <a:lstStyle/>
@@ -14258,13 +14268,13 @@
           <p:nvPr>
             <p:extLst>
               <p:ext uri="{D42A27DB-BD31-4B8C-83A1-F6EECF244321}">
-                <p14:modId xmlns:p14="http://schemas.microsoft.com/office/powerpoint/2010/main" val="1788781909"/>
+                <p14:modId xmlns:p14="http://schemas.microsoft.com/office/powerpoint/2010/main" val="3555986806"/>
               </p:ext>
             </p:extLst>
           </p:nvPr>
         </p:nvGraphicFramePr>
         <p:xfrm>
-          <a:off x="0" y="1997512"/>
+          <a:off x="3283261" y="501010"/>
           <a:ext cx="5213793" cy="3128161"/>
         </p:xfrm>
         <a:graphic>
@@ -14286,13 +14296,13 @@
           <p:nvPr>
             <p:extLst>
               <p:ext uri="{D42A27DB-BD31-4B8C-83A1-F6EECF244321}">
-                <p14:modId xmlns:p14="http://schemas.microsoft.com/office/powerpoint/2010/main" val="2451709126"/>
+                <p14:modId xmlns:p14="http://schemas.microsoft.com/office/powerpoint/2010/main" val="1757429658"/>
               </p:ext>
             </p:extLst>
           </p:nvPr>
         </p:nvGraphicFramePr>
         <p:xfrm>
-          <a:off x="5213793" y="1997512"/>
+          <a:off x="3283260" y="3629171"/>
           <a:ext cx="5213793" cy="3128161"/>
         </p:xfrm>
         <a:graphic>
@@ -14311,13 +14321,13 @@
   <p:clrMapOvr>
     <a:masterClrMapping/>
   </p:clrMapOvr>
-  <mc:AlternateContent xmlns:mc="http://schemas.openxmlformats.org/markup-compatibility/2006">
-    <mc:Choice xmlns:p159="http://schemas.microsoft.com/office/powerpoint/2015/09/main" Requires="p159">
+  <mc:AlternateContent xmlns:mc="http://schemas.openxmlformats.org/markup-compatibility/2006" xmlns:p159="http://schemas.microsoft.com/office/powerpoint/2015/09/main">
+    <mc:Choice Requires="p159">
       <p:transition spd="slow">
         <p159:morph option="byObject"/>
       </p:transition>
     </mc:Choice>
-    <mc:Fallback>
+    <mc:Fallback xmlns="">
       <p:transition spd="slow">
         <p:fade/>
       </p:transition>
@@ -14416,8 +14426,8 @@
           </a:prstGeom>
         </p:spPr>
       </p:pic>
-      <mc:AlternateContent xmlns:mc="http://schemas.openxmlformats.org/markup-compatibility/2006">
-        <mc:Choice xmlns:a14="http://schemas.microsoft.com/office/drawing/2010/main" Requires="a14">
+      <mc:AlternateContent xmlns:mc="http://schemas.openxmlformats.org/markup-compatibility/2006" xmlns:a14="http://schemas.microsoft.com/office/drawing/2010/main">
+        <mc:Choice Requires="a14">
           <p:sp>
             <p:nvSpPr>
               <p:cNvPr id="12" name="Content Placeholder 8">
@@ -14467,39 +14477,53 @@
                       <m:sSub>
                         <m:sSubPr>
                           <m:ctrlPr>
-                            <a:rPr lang="en-GB" i="1"/>
+                            <a:rPr lang="en-GB" i="1">
+                              <a:latin typeface="Cambria Math" panose="02040503050406030204" pitchFamily="18" charset="0"/>
+                            </a:rPr>
                           </m:ctrlPr>
                         </m:sSubPr>
                         <m:e>
                           <m:r>
-                            <a:rPr lang="de-AT" i="1"/>
+                            <a:rPr lang="de-AT" i="1">
+                              <a:latin typeface="Cambria Math" panose="02040503050406030204" pitchFamily="18" charset="0"/>
+                            </a:rPr>
                             <m:t>𝑅</m:t>
                           </m:r>
                         </m:e>
                         <m:sub>
                           <m:r>
-                            <a:rPr lang="de-AT" i="1"/>
+                            <a:rPr lang="de-AT" i="1">
+                              <a:latin typeface="Cambria Math" panose="02040503050406030204" pitchFamily="18" charset="0"/>
+                            </a:rPr>
                             <m:t>1 </m:t>
                           </m:r>
                         </m:sub>
                       </m:sSub>
                       <m:r>
-                        <a:rPr lang="de-AT" i="1"/>
+                        <a:rPr lang="de-AT" i="1">
+                          <a:latin typeface="Cambria Math" panose="02040503050406030204" pitchFamily="18" charset="0"/>
+                        </a:rPr>
                         <m:t>=</m:t>
                       </m:r>
                       <m:f>
                         <m:fPr>
                           <m:ctrlPr>
-                            <a:rPr lang="en-GB" i="1"/>
+                            <a:rPr lang="en-GB" i="1">
+                              <a:latin typeface="Cambria Math" panose="02040503050406030204" pitchFamily="18" charset="0"/>
+                            </a:rPr>
                           </m:ctrlPr>
                         </m:fPr>
                         <m:num>
                           <m:r>
-                            <a:rPr lang="de-AT" i="1"/>
+                            <a:rPr lang="de-AT" i="1">
+                              <a:latin typeface="Cambria Math" panose="02040503050406030204" pitchFamily="18" charset="0"/>
+                            </a:rPr>
                             <m:t>70</m:t>
                           </m:r>
                           <m:r>
-                            <a:rPr lang="de-AT" i="1"/>
+                            <a:rPr lang="de-AT" i="1">
+                              <a:latin typeface="Cambria Math" panose="02040503050406030204" pitchFamily="18" charset="0"/>
+                            </a:rPr>
                             <m:t>𝑉</m:t>
                           </m:r>
                         </m:num>
@@ -14507,26 +14531,36 @@
                           <m:f>
                             <m:fPr>
                               <m:ctrlPr>
-                                <a:rPr lang="en-GB" i="1"/>
+                                <a:rPr lang="en-GB" i="1">
+                                  <a:latin typeface="Cambria Math" panose="02040503050406030204" pitchFamily="18" charset="0"/>
+                                </a:rPr>
                               </m:ctrlPr>
                             </m:fPr>
                             <m:num>
                               <m:r>
-                                <a:rPr lang="de-AT" i="1"/>
+                                <a:rPr lang="de-AT" i="1">
+                                  <a:latin typeface="Cambria Math" panose="02040503050406030204" pitchFamily="18" charset="0"/>
+                                </a:rPr>
                                 <m:t>280</m:t>
                               </m:r>
                               <m:r>
-                                <a:rPr lang="de-AT" i="1"/>
+                                <a:rPr lang="de-AT" i="1">
+                                  <a:latin typeface="Cambria Math" panose="02040503050406030204" pitchFamily="18" charset="0"/>
+                                </a:rPr>
                                 <m:t>𝑉</m:t>
                               </m:r>
                             </m:num>
                             <m:den>
                               <m:r>
-                                <a:rPr lang="de-AT" i="1"/>
+                                <a:rPr lang="de-AT" i="1">
+                                  <a:latin typeface="Cambria Math" panose="02040503050406030204" pitchFamily="18" charset="0"/>
+                                </a:rPr>
                                 <m:t>2,5</m:t>
                               </m:r>
                               <m:r>
-                                <a:rPr lang="de-AT" i="1"/>
+                                <a:rPr lang="de-AT" i="1">
+                                  <a:latin typeface="Cambria Math" panose="02040503050406030204" pitchFamily="18" charset="0"/>
+                                </a:rPr>
                                 <m:t>𝑘</m:t>
                               </m:r>
                             </m:den>
@@ -14534,7 +14568,9 @@
                         </m:den>
                       </m:f>
                       <m:r>
-                        <a:rPr lang="de-AT" i="1"/>
+                        <a:rPr lang="de-AT" i="1">
+                          <a:latin typeface="Cambria Math" panose="02040503050406030204" pitchFamily="18" charset="0"/>
+                        </a:rPr>
                         <m:t>=625Ω</m:t>
                       </m:r>
                     </m:oMath>
@@ -14590,7 +14626,7 @@
             </p:txBody>
           </p:sp>
         </mc:Choice>
-        <mc:Fallback>
+        <mc:Fallback xmlns="">
           <p:sp>
             <p:nvSpPr>
               <p:cNvPr id="12" name="Content Placeholder 8">
@@ -14674,13 +14710,13 @@
   <p:clrMapOvr>
     <a:masterClrMapping/>
   </p:clrMapOvr>
-  <mc:AlternateContent xmlns:mc="http://schemas.openxmlformats.org/markup-compatibility/2006">
-    <mc:Choice xmlns:p159="http://schemas.microsoft.com/office/powerpoint/2015/09/main" Requires="p159">
+  <mc:AlternateContent xmlns:mc="http://schemas.openxmlformats.org/markup-compatibility/2006" xmlns:p159="http://schemas.microsoft.com/office/powerpoint/2015/09/main">
+    <mc:Choice Requires="p159">
       <p:transition spd="slow">
         <p159:morph option="byObject"/>
       </p:transition>
     </mc:Choice>
-    <mc:Fallback>
+    <mc:Fallback xmlns="">
       <p:transition spd="slow">
         <p:fade/>
       </p:transition>
@@ -14782,13 +14818,13 @@
   <p:clrMapOvr>
     <a:masterClrMapping/>
   </p:clrMapOvr>
-  <mc:AlternateContent xmlns:mc="http://schemas.openxmlformats.org/markup-compatibility/2006">
-    <mc:Choice xmlns:p159="http://schemas.microsoft.com/office/powerpoint/2015/09/main" Requires="p159">
+  <mc:AlternateContent xmlns:mc="http://schemas.openxmlformats.org/markup-compatibility/2006" xmlns:p159="http://schemas.microsoft.com/office/powerpoint/2015/09/main">
+    <mc:Choice Requires="p159">
       <p:transition spd="slow">
         <p159:morph option="byObject"/>
       </p:transition>
     </mc:Choice>
-    <mc:Fallback>
+    <mc:Fallback xmlns="">
       <p:transition spd="slow">
         <p:fade/>
       </p:transition>
@@ -14951,13 +14987,13 @@
   <p:clrMapOvr>
     <a:masterClrMapping/>
   </p:clrMapOvr>
-  <mc:AlternateContent xmlns:mc="http://schemas.openxmlformats.org/markup-compatibility/2006">
-    <mc:Choice xmlns:p159="http://schemas.microsoft.com/office/powerpoint/2015/09/main" Requires="p159">
+  <mc:AlternateContent xmlns:mc="http://schemas.openxmlformats.org/markup-compatibility/2006" xmlns:p159="http://schemas.microsoft.com/office/powerpoint/2015/09/main">
+    <mc:Choice Requires="p159">
       <p:transition spd="slow">
         <p159:morph option="byObject"/>
       </p:transition>
     </mc:Choice>
-    <mc:Fallback>
+    <mc:Fallback xmlns="">
       <p:transition spd="slow">
         <p:fade/>
       </p:transition>
@@ -15168,13 +15204,13 @@
   <p:clrMapOvr>
     <a:masterClrMapping/>
   </p:clrMapOvr>
-  <mc:AlternateContent xmlns:mc="http://schemas.openxmlformats.org/markup-compatibility/2006">
-    <mc:Choice xmlns:p159="http://schemas.microsoft.com/office/powerpoint/2015/09/main" Requires="p159">
+  <mc:AlternateContent xmlns:mc="http://schemas.openxmlformats.org/markup-compatibility/2006" xmlns:p159="http://schemas.microsoft.com/office/powerpoint/2015/09/main">
+    <mc:Choice Requires="p159">
       <p:transition spd="slow">
         <p159:morph option="byObject"/>
       </p:transition>
     </mc:Choice>
-    <mc:Fallback>
+    <mc:Fallback xmlns="">
       <p:transition spd="slow">
         <p:fade/>
       </p:transition>
@@ -15429,13 +15465,13 @@
   <p:clrMapOvr>
     <a:masterClrMapping/>
   </p:clrMapOvr>
-  <mc:AlternateContent xmlns:mc="http://schemas.openxmlformats.org/markup-compatibility/2006">
-    <mc:Choice xmlns:p159="http://schemas.microsoft.com/office/powerpoint/2015/09/main" Requires="p159">
+  <mc:AlternateContent xmlns:mc="http://schemas.openxmlformats.org/markup-compatibility/2006" xmlns:p159="http://schemas.microsoft.com/office/powerpoint/2015/09/main">
+    <mc:Choice Requires="p159">
       <p:transition spd="slow">
         <p159:morph option="byObject"/>
       </p:transition>
     </mc:Choice>
-    <mc:Fallback>
+    <mc:Fallback xmlns="">
       <p:transition spd="slow">
         <p:fade/>
       </p:transition>
@@ -15559,13 +15595,13 @@
   <p:clrMapOvr>
     <a:masterClrMapping/>
   </p:clrMapOvr>
-  <mc:AlternateContent xmlns:mc="http://schemas.openxmlformats.org/markup-compatibility/2006">
-    <mc:Choice xmlns:p159="http://schemas.microsoft.com/office/powerpoint/2015/09/main" Requires="p159">
+  <mc:AlternateContent xmlns:mc="http://schemas.openxmlformats.org/markup-compatibility/2006" xmlns:p159="http://schemas.microsoft.com/office/powerpoint/2015/09/main">
+    <mc:Choice Requires="p159">
       <p:transition spd="slow">
         <p159:morph option="byObject"/>
       </p:transition>
     </mc:Choice>
-    <mc:Fallback>
+    <mc:Fallback xmlns="">
       <p:transition spd="slow">
         <p:fade/>
       </p:transition>
@@ -15700,13 +15736,13 @@
   <p:clrMapOvr>
     <a:masterClrMapping/>
   </p:clrMapOvr>
-  <mc:AlternateContent xmlns:mc="http://schemas.openxmlformats.org/markup-compatibility/2006">
-    <mc:Choice xmlns:p159="http://schemas.microsoft.com/office/powerpoint/2015/09/main" Requires="p159">
+  <mc:AlternateContent xmlns:mc="http://schemas.openxmlformats.org/markup-compatibility/2006" xmlns:p159="http://schemas.microsoft.com/office/powerpoint/2015/09/main">
+    <mc:Choice Requires="p159">
       <p:transition spd="slow">
         <p159:morph option="byObject"/>
       </p:transition>
     </mc:Choice>
-    <mc:Fallback>
+    <mc:Fallback xmlns="">
       <p:transition spd="slow">
         <p:fade/>
       </p:transition>
@@ -15760,8 +15796,8 @@
           </a:p>
         </p:txBody>
       </p:sp>
-      <mc:AlternateContent xmlns:mc="http://schemas.openxmlformats.org/markup-compatibility/2006">
-        <mc:Choice xmlns:a14="http://schemas.microsoft.com/office/drawing/2010/main" Requires="a14">
+      <mc:AlternateContent xmlns:mc="http://schemas.openxmlformats.org/markup-compatibility/2006" xmlns:a14="http://schemas.microsoft.com/office/drawing/2010/main">
+        <mc:Choice Requires="a14">
           <p:graphicFrame>
             <p:nvGraphicFramePr>
               <p:cNvPr id="4" name="Inhaltsplatzhalter 3">
@@ -15962,8 +15998,9 @@
                                 <m:sSub>
                                   <m:sSubPr>
                                     <m:ctrlPr>
-                                      <a:rPr lang="en-GB" sz="1500">
+                                      <a:rPr lang="en-GB" sz="1500" i="1">
                                         <a:effectLst/>
+                                        <a:latin typeface="Cambria Math" panose="02040503050406030204" pitchFamily="18" charset="0"/>
                                       </a:rPr>
                                     </m:ctrlPr>
                                   </m:sSubPr>
@@ -15971,12 +16008,14 @@
                                     <m:r>
                                       <a:rPr lang="de-AT" sz="1500">
                                         <a:effectLst/>
+                                        <a:latin typeface="Cambria Math" panose="02040503050406030204" pitchFamily="18" charset="0"/>
                                       </a:rPr>
                                       <m:t>230 </m:t>
                                     </m:r>
                                     <m:r>
                                       <a:rPr lang="de-AT" sz="1500">
                                         <a:effectLst/>
+                                        <a:latin typeface="Cambria Math" panose="02040503050406030204" pitchFamily="18" charset="0"/>
                                       </a:rPr>
                                       <m:t>𝑉</m:t>
                                     </m:r>
@@ -15985,6 +16024,7 @@
                                     <m:r>
                                       <a:rPr lang="de-AT" sz="1500">
                                         <a:effectLst/>
+                                        <a:latin typeface="Cambria Math" panose="02040503050406030204" pitchFamily="18" charset="0"/>
                                       </a:rPr>
                                       <m:t>𝑅𝑀𝑆</m:t>
                                     </m:r>
@@ -16025,8 +16065,9 @@
                                 <m:sSub>
                                   <m:sSubPr>
                                     <m:ctrlPr>
-                                      <a:rPr lang="en-GB" sz="1500">
+                                      <a:rPr lang="en-GB" sz="1500" i="1">
                                         <a:effectLst/>
+                                        <a:latin typeface="Cambria Math" panose="02040503050406030204" pitchFamily="18" charset="0"/>
                                       </a:rPr>
                                     </m:ctrlPr>
                                   </m:sSubPr>
@@ -16034,12 +16075,14 @@
                                     <m:r>
                                       <a:rPr lang="de-AT" sz="1500">
                                         <a:effectLst/>
+                                        <a:latin typeface="Cambria Math" panose="02040503050406030204" pitchFamily="18" charset="0"/>
                                       </a:rPr>
                                       <m:t>250 </m:t>
                                     </m:r>
                                     <m:r>
                                       <a:rPr lang="de-AT" sz="1500">
                                         <a:effectLst/>
+                                        <a:latin typeface="Cambria Math" panose="02040503050406030204" pitchFamily="18" charset="0"/>
                                       </a:rPr>
                                       <m:t>𝑉</m:t>
                                     </m:r>
@@ -16048,6 +16091,7 @@
                                     <m:r>
                                       <a:rPr lang="de-AT" sz="1500">
                                         <a:effectLst/>
+                                        <a:latin typeface="Cambria Math" panose="02040503050406030204" pitchFamily="18" charset="0"/>
                                       </a:rPr>
                                       <m:t>𝑝𝑒𝑎𝑘</m:t>
                                     </m:r>
@@ -16134,14 +16178,16 @@
                                 <m:r>
                                   <a:rPr lang="de-AT" sz="1500">
                                     <a:effectLst/>
+                                    <a:latin typeface="Cambria Math" panose="02040503050406030204" pitchFamily="18" charset="0"/>
                                   </a:rPr>
                                   <m:t>6,3 </m:t>
                                 </m:r>
                                 <m:sSub>
                                   <m:sSubPr>
                                     <m:ctrlPr>
-                                      <a:rPr lang="en-GB" sz="1500">
+                                      <a:rPr lang="en-GB" sz="1500" i="1">
                                         <a:effectLst/>
+                                        <a:latin typeface="Cambria Math" panose="02040503050406030204" pitchFamily="18" charset="0"/>
                                       </a:rPr>
                                     </m:ctrlPr>
                                   </m:sSubPr>
@@ -16149,6 +16195,7 @@
                                     <m:r>
                                       <a:rPr lang="de-AT" sz="1500">
                                         <a:effectLst/>
+                                        <a:latin typeface="Cambria Math" panose="02040503050406030204" pitchFamily="18" charset="0"/>
                                       </a:rPr>
                                       <m:t>𝑉</m:t>
                                     </m:r>
@@ -16157,6 +16204,7 @@
                                     <m:r>
                                       <a:rPr lang="de-AT" sz="1500">
                                         <a:effectLst/>
+                                        <a:latin typeface="Cambria Math" panose="02040503050406030204" pitchFamily="18" charset="0"/>
                                       </a:rPr>
                                       <m:t>𝑅𝑀𝑆</m:t>
                                     </m:r>
@@ -16233,8 +16281,9 @@
                                 <m:f>
                                   <m:fPr>
                                     <m:ctrlPr>
-                                      <a:rPr lang="en-GB" sz="1500">
+                                      <a:rPr lang="en-GB" sz="1500" i="1">
                                         <a:effectLst/>
+                                        <a:latin typeface="Cambria Math" panose="02040503050406030204" pitchFamily="18" charset="0"/>
                                       </a:rPr>
                                     </m:ctrlPr>
                                   </m:fPr>
@@ -16242,48 +16291,56 @@
                                     <m:r>
                                       <a:rPr lang="de-AT" sz="1500">
                                         <a:effectLst/>
+                                        <a:latin typeface="Cambria Math" panose="02040503050406030204" pitchFamily="18" charset="0"/>
                                       </a:rPr>
                                       <m:t>104</m:t>
                                     </m:r>
                                     <m:r>
                                       <a:rPr lang="de-AT" sz="1500">
                                         <a:effectLst/>
+                                        <a:latin typeface="Cambria Math" panose="02040503050406030204" pitchFamily="18" charset="0"/>
                                       </a:rPr>
                                       <m:t>𝑚𝐴</m:t>
                                     </m:r>
                                     <m:r>
                                       <a:rPr lang="de-AT" sz="1500">
                                         <a:effectLst/>
+                                        <a:latin typeface="Cambria Math" panose="02040503050406030204" pitchFamily="18" charset="0"/>
                                       </a:rPr>
                                       <m:t>∗250</m:t>
                                     </m:r>
                                     <m:r>
                                       <a:rPr lang="de-AT" sz="1500">
                                         <a:effectLst/>
+                                        <a:latin typeface="Cambria Math" panose="02040503050406030204" pitchFamily="18" charset="0"/>
                                       </a:rPr>
                                       <m:t>𝑉</m:t>
                                     </m:r>
                                     <m:r>
                                       <a:rPr lang="de-AT" sz="1500">
                                         <a:effectLst/>
+                                        <a:latin typeface="Cambria Math" panose="02040503050406030204" pitchFamily="18" charset="0"/>
                                       </a:rPr>
                                       <m:t>+1,6</m:t>
                                     </m:r>
                                     <m:r>
                                       <a:rPr lang="de-AT" sz="1500">
                                         <a:effectLst/>
+                                        <a:latin typeface="Cambria Math" panose="02040503050406030204" pitchFamily="18" charset="0"/>
                                       </a:rPr>
                                       <m:t>𝐴</m:t>
                                     </m:r>
                                     <m:r>
                                       <a:rPr lang="de-AT" sz="1500">
                                         <a:effectLst/>
+                                        <a:latin typeface="Cambria Math" panose="02040503050406030204" pitchFamily="18" charset="0"/>
                                       </a:rPr>
                                       <m:t>∗6,3</m:t>
                                     </m:r>
                                     <m:r>
                                       <a:rPr lang="de-AT" sz="1500">
                                         <a:effectLst/>
+                                        <a:latin typeface="Cambria Math" panose="02040503050406030204" pitchFamily="18" charset="0"/>
                                       </a:rPr>
                                       <m:t>𝑉</m:t>
                                     </m:r>
@@ -16292,12 +16349,14 @@
                                     <m:r>
                                       <a:rPr lang="de-AT" sz="1500">
                                         <a:effectLst/>
+                                        <a:latin typeface="Cambria Math" panose="02040503050406030204" pitchFamily="18" charset="0"/>
                                       </a:rPr>
                                       <m:t>230</m:t>
                                     </m:r>
                                     <m:r>
                                       <a:rPr lang="de-AT" sz="1500">
                                         <a:effectLst/>
+                                        <a:latin typeface="Cambria Math" panose="02040503050406030204" pitchFamily="18" charset="0"/>
                                       </a:rPr>
                                       <m:t>𝑉</m:t>
                                     </m:r>
@@ -16306,24 +16365,28 @@
                                 <m:r>
                                   <a:rPr lang="de-AT" sz="1500">
                                     <a:effectLst/>
+                                    <a:latin typeface="Cambria Math" panose="02040503050406030204" pitchFamily="18" charset="0"/>
                                   </a:rPr>
                                   <m:t>=</m:t>
                                 </m:r>
                                 <m:r>
                                   <a:rPr lang="de-AT" sz="1500" b="1" i="1">
                                     <a:effectLst/>
+                                    <a:latin typeface="Cambria Math" panose="02040503050406030204" pitchFamily="18" charset="0"/>
                                   </a:rPr>
                                   <m:t>𝟎</m:t>
                                 </m:r>
                                 <m:r>
                                   <a:rPr lang="de-AT" sz="1500" b="1">
                                     <a:effectLst/>
+                                    <a:latin typeface="Cambria Math" panose="02040503050406030204" pitchFamily="18" charset="0"/>
                                   </a:rPr>
                                   <m:t>,</m:t>
                                 </m:r>
                                 <m:r>
                                   <a:rPr lang="de-AT" sz="1500" b="1" i="1">
                                     <a:effectLst/>
+                                    <a:latin typeface="Cambria Math" panose="02040503050406030204" pitchFamily="18" charset="0"/>
                                   </a:rPr>
                                   <m:t>𝟏𝟓𝟕𝐀</m:t>
                                 </m:r>
@@ -16354,8 +16417,9 @@
                               <m:sSub>
                                 <m:sSubPr>
                                   <m:ctrlPr>
-                                    <a:rPr lang="en-GB" sz="1500">
+                                    <a:rPr lang="en-GB" sz="1500" i="1">
                                       <a:effectLst/>
+                                      <a:latin typeface="Cambria Math" panose="02040503050406030204" pitchFamily="18" charset="0"/>
                                     </a:rPr>
                                   </m:ctrlPr>
                                 </m:sSubPr>
@@ -16363,12 +16427,14 @@
                                   <m:r>
                                     <a:rPr lang="de-AT" sz="1500">
                                       <a:effectLst/>
+                                      <a:latin typeface="Cambria Math" panose="02040503050406030204" pitchFamily="18" charset="0"/>
                                     </a:rPr>
                                     <m:t>230 </m:t>
                                   </m:r>
                                   <m:r>
                                     <a:rPr lang="de-AT" sz="1500">
                                       <a:effectLst/>
+                                      <a:latin typeface="Cambria Math" panose="02040503050406030204" pitchFamily="18" charset="0"/>
                                     </a:rPr>
                                     <m:t>𝑉</m:t>
                                   </m:r>
@@ -16377,6 +16443,7 @@
                                   <m:r>
                                     <a:rPr lang="de-AT" sz="1500">
                                       <a:effectLst/>
+                                      <a:latin typeface="Cambria Math" panose="02040503050406030204" pitchFamily="18" charset="0"/>
                                     </a:rPr>
                                     <m:t>𝑅𝑀𝑆</m:t>
                                   </m:r>
@@ -16418,36 +16485,42 @@
                               <m:r>
                                 <a:rPr lang="de-AT" sz="1500">
                                   <a:effectLst/>
+                                  <a:latin typeface="Cambria Math" panose="02040503050406030204" pitchFamily="18" charset="0"/>
                                 </a:rPr>
                                 <m:t>2∗(50 </m:t>
                               </m:r>
                               <m:r>
                                 <a:rPr lang="de-AT" sz="1500">
                                   <a:effectLst/>
+                                  <a:latin typeface="Cambria Math" panose="02040503050406030204" pitchFamily="18" charset="0"/>
                                 </a:rPr>
                                 <m:t>𝑚𝐴</m:t>
                               </m:r>
                               <m:r>
                                 <a:rPr lang="de-AT" sz="1500">
                                   <a:effectLst/>
+                                  <a:latin typeface="Cambria Math" panose="02040503050406030204" pitchFamily="18" charset="0"/>
                                 </a:rPr>
                                 <m:t>+2</m:t>
                               </m:r>
                               <m:r>
                                 <a:rPr lang="de-AT" sz="1500">
                                   <a:effectLst/>
+                                  <a:latin typeface="Cambria Math" panose="02040503050406030204" pitchFamily="18" charset="0"/>
                                 </a:rPr>
                                 <m:t>𝑚𝐴</m:t>
                               </m:r>
                               <m:r>
                                 <a:rPr lang="de-AT" sz="1500">
                                   <a:effectLst/>
+                                  <a:latin typeface="Cambria Math" panose="02040503050406030204" pitchFamily="18" charset="0"/>
                                 </a:rPr>
                                 <m:t>)=</m:t>
                               </m:r>
                               <m:r>
                                 <a:rPr lang="de-AT" sz="1500" b="1" i="1">
                                   <a:effectLst/>
+                                  <a:latin typeface="Cambria Math" panose="02040503050406030204" pitchFamily="18" charset="0"/>
                                 </a:rPr>
                                 <m:t>𝟏𝟎𝟒𝐦𝐀</m:t>
                               </m:r>
@@ -16483,8 +16556,9 @@
                               <m:sSub>
                                 <m:sSubPr>
                                   <m:ctrlPr>
-                                    <a:rPr lang="en-GB" sz="1500">
+                                    <a:rPr lang="en-GB" sz="1500" i="1">
                                       <a:effectLst/>
+                                      <a:latin typeface="Cambria Math" panose="02040503050406030204" pitchFamily="18" charset="0"/>
                                     </a:rPr>
                                   </m:ctrlPr>
                                 </m:sSubPr>
@@ -16492,12 +16566,14 @@
                                   <m:r>
                                     <a:rPr lang="de-AT" sz="1500">
                                       <a:effectLst/>
+                                      <a:latin typeface="Cambria Math" panose="02040503050406030204" pitchFamily="18" charset="0"/>
                                     </a:rPr>
                                     <m:t>250 </m:t>
                                   </m:r>
                                   <m:r>
                                     <a:rPr lang="de-AT" sz="1500">
                                       <a:effectLst/>
+                                      <a:latin typeface="Cambria Math" panose="02040503050406030204" pitchFamily="18" charset="0"/>
                                     </a:rPr>
                                     <m:t>𝑉</m:t>
                                   </m:r>
@@ -16506,6 +16582,7 @@
                                   <m:r>
                                     <a:rPr lang="de-AT" sz="1500">
                                       <a:effectLst/>
+                                      <a:latin typeface="Cambria Math" panose="02040503050406030204" pitchFamily="18" charset="0"/>
                                     </a:rPr>
                                     <m:t>𝑝𝑒𝑎𝑘</m:t>
                                   </m:r>
@@ -16593,8 +16670,9 @@
                               <m:sSup>
                                 <m:sSupPr>
                                   <m:ctrlPr>
-                                    <a:rPr lang="en-GB" sz="1500">
+                                    <a:rPr lang="en-GB" sz="1500" i="1">
                                       <a:effectLst/>
+                                      <a:latin typeface="Cambria Math" panose="02040503050406030204" pitchFamily="18" charset="0"/>
                                     </a:rPr>
                                   </m:ctrlPr>
                                 </m:sSupPr>
@@ -16602,6 +16680,7 @@
                                   <m:r>
                                     <a:rPr lang="de-AT" sz="1500">
                                       <a:effectLst/>
+                                      <a:latin typeface="Cambria Math" panose="02040503050406030204" pitchFamily="18" charset="0"/>
                                     </a:rPr>
                                     <m:t>2</m:t>
                                   </m:r>
@@ -16610,6 +16689,7 @@
                                   <m:r>
                                     <a:rPr lang="de-AT" sz="1500" baseline="30000">
                                       <a:effectLst/>
+                                      <a:latin typeface="Cambria Math" panose="02040503050406030204" pitchFamily="18" charset="0"/>
                                     </a:rPr>
                                     <m:t>1</m:t>
                                   </m:r>
@@ -16618,14 +16698,16 @@
                               <m:r>
                                 <a:rPr lang="de-AT" sz="1500">
                                   <a:effectLst/>
+                                  <a:latin typeface="Cambria Math" panose="02040503050406030204" pitchFamily="18" charset="0"/>
                                 </a:rPr>
                                 <m:t>∗</m:t>
                               </m:r>
                               <m:d>
                                 <m:dPr>
                                   <m:ctrlPr>
-                                    <a:rPr lang="en-GB" sz="1500">
+                                    <a:rPr lang="en-GB" sz="1500" i="1">
                                       <a:effectLst/>
+                                      <a:latin typeface="Cambria Math" panose="02040503050406030204" pitchFamily="18" charset="0"/>
                                     </a:rPr>
                                   </m:ctrlPr>
                                 </m:dPr>
@@ -16633,14 +16715,16 @@
                                   <m:r>
                                     <a:rPr lang="de-AT" sz="1500">
                                       <a:effectLst/>
+                                      <a:latin typeface="Cambria Math" panose="02040503050406030204" pitchFamily="18" charset="0"/>
                                     </a:rPr>
                                     <m:t>0,76</m:t>
                                   </m:r>
                                   <m:sSup>
                                     <m:sSupPr>
                                       <m:ctrlPr>
-                                        <a:rPr lang="en-GB" sz="1500">
+                                        <a:rPr lang="en-GB" sz="1500" i="1">
                                           <a:effectLst/>
+                                          <a:latin typeface="Cambria Math" panose="02040503050406030204" pitchFamily="18" charset="0"/>
                                         </a:rPr>
                                       </m:ctrlPr>
                                     </m:sSupPr>
@@ -16648,6 +16732,7 @@
                                       <m:r>
                                         <a:rPr lang="de-AT" sz="1500">
                                           <a:effectLst/>
+                                          <a:latin typeface="Cambria Math" panose="02040503050406030204" pitchFamily="18" charset="0"/>
                                         </a:rPr>
                                         <m:t>𝐴</m:t>
                                       </m:r>
@@ -16656,6 +16741,7 @@
                                       <m:r>
                                         <a:rPr lang="de-AT" sz="1500" baseline="30000">
                                           <a:effectLst/>
+                                          <a:latin typeface="Cambria Math" panose="02040503050406030204" pitchFamily="18" charset="0"/>
                                         </a:rPr>
                                         <m:t>2</m:t>
                                       </m:r>
@@ -16664,14 +16750,16 @@
                                   <m:r>
                                     <a:rPr lang="de-AT" sz="1500">
                                       <a:effectLst/>
+                                      <a:latin typeface="Cambria Math" panose="02040503050406030204" pitchFamily="18" charset="0"/>
                                     </a:rPr>
                                     <m:t>+0,3</m:t>
                                   </m:r>
                                   <m:sSup>
                                     <m:sSupPr>
                                       <m:ctrlPr>
-                                        <a:rPr lang="en-GB" sz="1500">
+                                        <a:rPr lang="en-GB" sz="1500" i="1">
                                           <a:effectLst/>
+                                          <a:latin typeface="Cambria Math" panose="02040503050406030204" pitchFamily="18" charset="0"/>
                                         </a:rPr>
                                       </m:ctrlPr>
                                     </m:sSupPr>
@@ -16679,6 +16767,7 @@
                                       <m:r>
                                         <a:rPr lang="de-AT" sz="1500">
                                           <a:effectLst/>
+                                          <a:latin typeface="Cambria Math" panose="02040503050406030204" pitchFamily="18" charset="0"/>
                                         </a:rPr>
                                         <m:t>𝐴</m:t>
                                       </m:r>
@@ -16687,6 +16776,7 @@
                                       <m:r>
                                         <a:rPr lang="de-AT" sz="1500" baseline="30000">
                                           <a:effectLst/>
+                                          <a:latin typeface="Cambria Math" panose="02040503050406030204" pitchFamily="18" charset="0"/>
                                         </a:rPr>
                                         <m:t>3</m:t>
                                       </m:r>
@@ -16697,24 +16787,28 @@
                               <m:r>
                                 <a:rPr lang="de-AT" sz="1500">
                                   <a:effectLst/>
+                                  <a:latin typeface="Cambria Math" panose="02040503050406030204" pitchFamily="18" charset="0"/>
                                 </a:rPr>
                                 <m:t>=</m:t>
                               </m:r>
                               <m:r>
                                 <a:rPr lang="de-AT" sz="1500" b="1" i="1">
                                   <a:effectLst/>
+                                  <a:latin typeface="Cambria Math" panose="02040503050406030204" pitchFamily="18" charset="0"/>
                                 </a:rPr>
                                 <m:t>𝟏</m:t>
                               </m:r>
                               <m:r>
                                 <a:rPr lang="de-AT" sz="1500" b="1">
                                   <a:effectLst/>
+                                  <a:latin typeface="Cambria Math" panose="02040503050406030204" pitchFamily="18" charset="0"/>
                                 </a:rPr>
                                 <m:t>,</m:t>
                               </m:r>
                               <m:r>
                                 <a:rPr lang="de-AT" sz="1500" b="1" i="1">
                                   <a:effectLst/>
+                                  <a:latin typeface="Cambria Math" panose="02040503050406030204" pitchFamily="18" charset="0"/>
                                 </a:rPr>
                                 <m:t>𝟔𝐀</m:t>
                               </m:r>
@@ -16750,14 +16844,16 @@
                               <m:r>
                                 <a:rPr lang="de-AT" sz="1500">
                                   <a:effectLst/>
+                                  <a:latin typeface="Cambria Math" panose="02040503050406030204" pitchFamily="18" charset="0"/>
                                 </a:rPr>
                                 <m:t>6,3 </m:t>
                               </m:r>
                               <m:sSub>
                                 <m:sSubPr>
                                   <m:ctrlPr>
-                                    <a:rPr lang="en-GB" sz="1500">
+                                    <a:rPr lang="en-GB" sz="1500" i="1">
                                       <a:effectLst/>
+                                      <a:latin typeface="Cambria Math" panose="02040503050406030204" pitchFamily="18" charset="0"/>
                                     </a:rPr>
                                   </m:ctrlPr>
                                 </m:sSubPr>
@@ -16765,6 +16861,7 @@
                                   <m:r>
                                     <a:rPr lang="de-AT" sz="1500">
                                       <a:effectLst/>
+                                      <a:latin typeface="Cambria Math" panose="02040503050406030204" pitchFamily="18" charset="0"/>
                                     </a:rPr>
                                     <m:t>𝑉</m:t>
                                   </m:r>
@@ -16773,6 +16870,7 @@
                                   <m:r>
                                     <a:rPr lang="de-AT" sz="1500">
                                       <a:effectLst/>
+                                      <a:latin typeface="Cambria Math" panose="02040503050406030204" pitchFamily="18" charset="0"/>
                                     </a:rPr>
                                     <m:t>𝑅𝑀𝑆</m:t>
                                   </m:r>
@@ -16807,7 +16905,7 @@
             </a:graphic>
           </p:graphicFrame>
         </mc:Choice>
-        <mc:Fallback>
+        <mc:Fallback xmlns="">
           <p:graphicFrame>
             <p:nvGraphicFramePr>
               <p:cNvPr id="4" name="Inhaltsplatzhalter 3">
@@ -17601,13 +17699,13 @@
   <p:clrMapOvr>
     <a:masterClrMapping/>
   </p:clrMapOvr>
-  <mc:AlternateContent xmlns:mc="http://schemas.openxmlformats.org/markup-compatibility/2006">
-    <mc:Choice xmlns:p159="http://schemas.microsoft.com/office/powerpoint/2015/09/main" Requires="p159">
+  <mc:AlternateContent xmlns:mc="http://schemas.openxmlformats.org/markup-compatibility/2006" xmlns:p159="http://schemas.microsoft.com/office/powerpoint/2015/09/main">
+    <mc:Choice Requires="p159">
       <p:transition spd="slow">
         <p159:morph option="byObject"/>
       </p:transition>
     </mc:Choice>
-    <mc:Fallback>
+    <mc:Fallback xmlns="">
       <p:transition spd="slow">
         <p:fade/>
       </p:transition>
@@ -17701,8 +17799,8 @@
           </a:p>
         </p:txBody>
       </p:sp>
-      <mc:AlternateContent xmlns:mc="http://schemas.openxmlformats.org/markup-compatibility/2006">
-        <mc:Choice xmlns:a14="http://schemas.microsoft.com/office/drawing/2010/main" Requires="a14">
+      <mc:AlternateContent xmlns:mc="http://schemas.openxmlformats.org/markup-compatibility/2006" xmlns:a14="http://schemas.microsoft.com/office/drawing/2010/main">
+        <mc:Choice Requires="a14">
           <p:graphicFrame>
             <p:nvGraphicFramePr>
               <p:cNvPr id="5" name="Inhaltsplatzhalter 3">
@@ -17857,6 +17955,7 @@
                                 <m:r>
                                   <a:rPr lang="en-GB" sz="1600" smtClean="0">
                                     <a:effectLst/>
+                                    <a:latin typeface="Cambria Math" panose="02040503050406030204" pitchFamily="18" charset="0"/>
                                   </a:rPr>
                                   <m:t>𝟏𝟎𝟎𝐕</m:t>
                                 </m:r>
@@ -18418,7 +18517,7 @@
             </a:graphic>
           </p:graphicFrame>
         </mc:Choice>
-        <mc:Fallback>
+        <mc:Fallback xmlns="">
           <p:graphicFrame>
             <p:nvGraphicFramePr>
               <p:cNvPr id="5" name="Inhaltsplatzhalter 3">
@@ -18918,13 +19017,13 @@
   <p:clrMapOvr>
     <a:masterClrMapping/>
   </p:clrMapOvr>
-  <mc:AlternateContent xmlns:mc="http://schemas.openxmlformats.org/markup-compatibility/2006">
-    <mc:Choice xmlns:p159="http://schemas.microsoft.com/office/powerpoint/2015/09/main" Requires="p159">
+  <mc:AlternateContent xmlns:mc="http://schemas.openxmlformats.org/markup-compatibility/2006" xmlns:p159="http://schemas.microsoft.com/office/powerpoint/2015/09/main">
+    <mc:Choice Requires="p159">
       <p:transition spd="slow">
         <p159:morph option="byObject"/>
       </p:transition>
     </mc:Choice>
-    <mc:Fallback>
+    <mc:Fallback xmlns="">
       <p:transition spd="slow">
         <p:fade/>
       </p:transition>
@@ -18978,8 +19077,8 @@
           </a:p>
         </p:txBody>
       </p:sp>
-      <mc:AlternateContent xmlns:mc="http://schemas.openxmlformats.org/markup-compatibility/2006">
-        <mc:Choice xmlns:a14="http://schemas.microsoft.com/office/drawing/2010/main" Requires="a14">
+      <mc:AlternateContent xmlns:mc="http://schemas.openxmlformats.org/markup-compatibility/2006" xmlns:a14="http://schemas.microsoft.com/office/drawing/2010/main">
+        <mc:Choice Requires="a14">
           <p:sp>
             <p:nvSpPr>
               <p:cNvPr id="3" name="Inhaltsplatzhalter 2">
@@ -19057,7 +19156,7 @@
             </p:txBody>
           </p:sp>
         </mc:Choice>
-        <mc:Fallback>
+        <mc:Fallback xmlns="">
           <p:sp>
             <p:nvSpPr>
               <p:cNvPr id="3" name="Inhaltsplatzhalter 2">
@@ -19228,13 +19327,13 @@
   <p:clrMapOvr>
     <a:masterClrMapping/>
   </p:clrMapOvr>
-  <mc:AlternateContent xmlns:mc="http://schemas.openxmlformats.org/markup-compatibility/2006">
-    <mc:Choice xmlns:p159="http://schemas.microsoft.com/office/powerpoint/2015/09/main" Requires="p159">
+  <mc:AlternateContent xmlns:mc="http://schemas.openxmlformats.org/markup-compatibility/2006" xmlns:p159="http://schemas.microsoft.com/office/powerpoint/2015/09/main">
+    <mc:Choice Requires="p159">
       <p:transition spd="slow">
         <p159:morph option="byObject"/>
       </p:transition>
     </mc:Choice>
-    <mc:Fallback>
+    <mc:Fallback xmlns="">
       <p:transition spd="slow">
         <p:fade/>
       </p:transition>
@@ -19246,7 +19345,7 @@
 <file path=ppt/theme/theme1.xml><?xml version="1.0" encoding="utf-8"?>
 <a:theme xmlns:a="http://schemas.openxmlformats.org/drawingml/2006/main" name="Facette">
   <a:themeElements>
-    <a:clrScheme name="Facet">
+    <a:clrScheme name="Ganymed">
       <a:dk1>
         <a:sysClr val="windowText" lastClr="000000"/>
       </a:dk1>
@@ -19254,34 +19353,34 @@
         <a:sysClr val="window" lastClr="FFFFFF"/>
       </a:lt1>
       <a:dk2>
-        <a:srgbClr val="2C3C43"/>
+        <a:srgbClr val="323232"/>
       </a:dk2>
       <a:lt2>
-        <a:srgbClr val="EBEBEB"/>
+        <a:srgbClr val="E3DED1"/>
       </a:lt2>
       <a:accent1>
-        <a:srgbClr val="5FCBEF"/>
+        <a:srgbClr val="F07F09"/>
       </a:accent1>
       <a:accent2>
-        <a:srgbClr val="2E83C3"/>
+        <a:srgbClr val="9F2936"/>
       </a:accent2>
       <a:accent3>
-        <a:srgbClr val="42D0A2"/>
+        <a:srgbClr val="1B587C"/>
       </a:accent3>
       <a:accent4>
-        <a:srgbClr val="2E946B"/>
+        <a:srgbClr val="4E8542"/>
       </a:accent4>
       <a:accent5>
-        <a:srgbClr val="42B051"/>
+        <a:srgbClr val="604878"/>
       </a:accent5>
       <a:accent6>
-        <a:srgbClr val="96D141"/>
+        <a:srgbClr val="C19859"/>
       </a:accent6>
       <a:hlink>
-        <a:srgbClr val="3FCDE7"/>
+        <a:srgbClr val="6B9F25"/>
       </a:hlink>
       <a:folHlink>
-        <a:srgbClr val="A9D3E1"/>
+        <a:srgbClr val="B26B02"/>
       </a:folHlink>
     </a:clrScheme>
     <a:fontScheme name="Facet">

</xml_diff>

<commit_message>
Added some Animations and tweaked some spelling mistaes
</commit_message>
<xml_diff>
--- a/Präsentation/Röhrenverstärker.pptx
+++ b/Präsentation/Röhrenverstärker.pptx
@@ -131,7 +131,7 @@
 <file path=ppt/charts/chart1.xml><?xml version="1.0" encoding="utf-8"?>
 <c:chartSpace xmlns:c="http://schemas.openxmlformats.org/drawingml/2006/chart" xmlns:a="http://schemas.openxmlformats.org/drawingml/2006/main" xmlns:r="http://schemas.openxmlformats.org/officeDocument/2006/relationships" xmlns:c16r2="http://schemas.microsoft.com/office/drawing/2015/06/chart">
   <c:date1904 val="0"/>
-  <c:lang val="en-US"/>
+  <c:lang val="de-DE"/>
   <c:roundedCorners val="0"/>
   <mc:AlternateContent xmlns:mc="http://schemas.openxmlformats.org/markup-compatibility/2006">
     <mc:Choice xmlns:c14="http://schemas.microsoft.com/office/drawing/2007/8/2/chart" Requires="c14">
@@ -3579,7 +3579,7 @@
 <file path=ppt/charts/chart2.xml><?xml version="1.0" encoding="utf-8"?>
 <c:chartSpace xmlns:c="http://schemas.openxmlformats.org/drawingml/2006/chart" xmlns:a="http://schemas.openxmlformats.org/drawingml/2006/main" xmlns:r="http://schemas.openxmlformats.org/officeDocument/2006/relationships" xmlns:c16r2="http://schemas.microsoft.com/office/drawing/2015/06/chart">
   <c:date1904 val="0"/>
-  <c:lang val="en-US"/>
+  <c:lang val="de-DE"/>
   <c:roundedCorners val="0"/>
   <mc:AlternateContent xmlns:mc="http://schemas.openxmlformats.org/markup-compatibility/2006">
     <mc:Choice xmlns:c14="http://schemas.microsoft.com/office/drawing/2007/8/2/chart" Requires="c14">
@@ -3652,10 +3652,10 @@
           <c:layoutTarget val="inner"/>
           <c:xMode val="edge"/>
           <c:yMode val="edge"/>
-          <c:x val="0.15698680026107847"/>
-          <c:y val="0.13261069263273931"/>
-          <c:w val="0.77225711369412153"/>
-          <c:h val="0.76742590714650472"/>
+          <c:x val="0.1848232179528416"/>
+          <c:y val="0.12043114149175828"/>
+          <c:w val="0.7308477724374558"/>
+          <c:h val="0.72276714657589558"/>
         </c:manualLayout>
       </c:layout>
       <c:scatterChart>
@@ -8892,7 +8892,7 @@
             <a:fld id="{B61BEF0D-F0BB-DE4B-95CE-6DB70DBA9567}" type="datetimeFigureOut">
               <a:rPr lang="en-US" dirty="0"/>
               <a:pPr/>
-              <a:t>1/21/2019</a:t>
+              <a:t>1/22/2019</a:t>
             </a:fld>
             <a:endParaRPr lang="en-US" dirty="0"/>
           </a:p>
@@ -8935,7 +8935,7 @@
             <a:fld id="{D57F1E4F-1CFF-5643-939E-217C01CDF565}" type="slidenum">
               <a:rPr lang="en-US" dirty="0"/>
               <a:pPr/>
-              <a:t>‹#›</a:t>
+              <a:t>‹Nr.›</a:t>
             </a:fld>
             <a:endParaRPr lang="en-US" dirty="0"/>
           </a:p>
@@ -9152,7 +9152,7 @@
             <a:fld id="{B61BEF0D-F0BB-DE4B-95CE-6DB70DBA9567}" type="datetimeFigureOut">
               <a:rPr lang="en-US" dirty="0"/>
               <a:pPr/>
-              <a:t>1/21/2019</a:t>
+              <a:t>1/22/2019</a:t>
             </a:fld>
             <a:endParaRPr lang="en-US" dirty="0"/>
           </a:p>
@@ -9195,7 +9195,7 @@
             <a:fld id="{D57F1E4F-1CFF-5643-939E-217C01CDF565}" type="slidenum">
               <a:rPr lang="en-US" dirty="0"/>
               <a:pPr/>
-              <a:t>‹#›</a:t>
+              <a:t>‹Nr.›</a:t>
             </a:fld>
             <a:endParaRPr lang="en-US" dirty="0"/>
           </a:p>
@@ -9475,7 +9475,7 @@
             <a:fld id="{B61BEF0D-F0BB-DE4B-95CE-6DB70DBA9567}" type="datetimeFigureOut">
               <a:rPr lang="en-US" dirty="0"/>
               <a:pPr/>
-              <a:t>1/21/2019</a:t>
+              <a:t>1/22/2019</a:t>
             </a:fld>
             <a:endParaRPr lang="en-US" dirty="0"/>
           </a:p>
@@ -9518,7 +9518,7 @@
             <a:fld id="{D57F1E4F-1CFF-5643-939E-217C01CDF565}" type="slidenum">
               <a:rPr lang="en-US" dirty="0"/>
               <a:pPr/>
-              <a:t>‹#›</a:t>
+              <a:t>‹Nr.›</a:t>
             </a:fld>
             <a:endParaRPr lang="en-US" dirty="0"/>
           </a:p>
@@ -9817,7 +9817,7 @@
             <a:fld id="{B61BEF0D-F0BB-DE4B-95CE-6DB70DBA9567}" type="datetimeFigureOut">
               <a:rPr lang="en-US" dirty="0"/>
               <a:pPr/>
-              <a:t>1/21/2019</a:t>
+              <a:t>1/22/2019</a:t>
             </a:fld>
             <a:endParaRPr lang="en-US" dirty="0"/>
           </a:p>
@@ -9860,7 +9860,7 @@
             <a:fld id="{D57F1E4F-1CFF-5643-939E-217C01CDF565}" type="slidenum">
               <a:rPr lang="en-US" dirty="0"/>
               <a:pPr/>
-              <a:t>‹#›</a:t>
+              <a:t>‹Nr.›</a:t>
             </a:fld>
             <a:endParaRPr lang="en-US" dirty="0"/>
           </a:p>
@@ -10140,7 +10140,7 @@
             <a:fld id="{B61BEF0D-F0BB-DE4B-95CE-6DB70DBA9567}" type="datetimeFigureOut">
               <a:rPr lang="en-US" dirty="0"/>
               <a:pPr/>
-              <a:t>1/21/2019</a:t>
+              <a:t>1/22/2019</a:t>
             </a:fld>
             <a:endParaRPr lang="en-US" dirty="0"/>
           </a:p>
@@ -10183,7 +10183,7 @@
             <a:fld id="{D57F1E4F-1CFF-5643-939E-217C01CDF565}" type="slidenum">
               <a:rPr lang="en-US" dirty="0"/>
               <a:pPr/>
-              <a:t>‹#›</a:t>
+              <a:t>‹Nr.›</a:t>
             </a:fld>
             <a:endParaRPr lang="en-US" dirty="0"/>
           </a:p>
@@ -10542,7 +10542,7 @@
             <a:fld id="{B61BEF0D-F0BB-DE4B-95CE-6DB70DBA9567}" type="datetimeFigureOut">
               <a:rPr lang="en-US" dirty="0"/>
               <a:pPr/>
-              <a:t>1/21/2019</a:t>
+              <a:t>1/22/2019</a:t>
             </a:fld>
             <a:endParaRPr lang="en-US" dirty="0"/>
           </a:p>
@@ -10585,7 +10585,7 @@
             <a:fld id="{D57F1E4F-1CFF-5643-939E-217C01CDF565}" type="slidenum">
               <a:rPr lang="en-US" dirty="0"/>
               <a:pPr/>
-              <a:t>‹#›</a:t>
+              <a:t>‹Nr.›</a:t>
             </a:fld>
             <a:endParaRPr lang="en-US" dirty="0"/>
           </a:p>
@@ -10720,7 +10720,7 @@
           <a:p>
             <a:fld id="{55C6B4A9-1611-4792-9094-5F34BCA07E0B}" type="datetimeFigureOut">
               <a:rPr lang="en-US" dirty="0"/>
-              <a:t>1/21/2019</a:t>
+              <a:t>1/22/2019</a:t>
             </a:fld>
             <a:endParaRPr lang="en-US" dirty="0"/>
           </a:p>
@@ -10762,7 +10762,7 @@
           <a:p>
             <a:fld id="{89333C77-0158-454C-844F-B7AB9BD7DAD4}" type="slidenum">
               <a:rPr lang="en-US" dirty="0"/>
-              <a:t>‹#›</a:t>
+              <a:t>‹Nr.›</a:t>
             </a:fld>
             <a:endParaRPr lang="en-US" dirty="0"/>
           </a:p>
@@ -10908,7 +10908,7 @@
             <a:fld id="{B61BEF0D-F0BB-DE4B-95CE-6DB70DBA9567}" type="datetimeFigureOut">
               <a:rPr lang="en-US" dirty="0"/>
               <a:pPr/>
-              <a:t>1/21/2019</a:t>
+              <a:t>1/22/2019</a:t>
             </a:fld>
             <a:endParaRPr lang="en-US" dirty="0"/>
           </a:p>
@@ -10951,7 +10951,7 @@
             <a:fld id="{D57F1E4F-1CFF-5643-939E-217C01CDF565}" type="slidenum">
               <a:rPr lang="en-US" dirty="0"/>
               <a:pPr/>
-              <a:t>‹#›</a:t>
+              <a:t>‹Nr.›</a:t>
             </a:fld>
             <a:endParaRPr lang="en-US" dirty="0"/>
           </a:p>
@@ -11086,7 +11086,7 @@
           <a:p>
             <a:fld id="{42A54C80-263E-416B-A8E0-580EDEADCBDC}" type="datetimeFigureOut">
               <a:rPr lang="en-US" dirty="0"/>
-              <a:t>1/21/2019</a:t>
+              <a:t>1/22/2019</a:t>
             </a:fld>
             <a:endParaRPr lang="en-US" dirty="0"/>
           </a:p>
@@ -11128,7 +11128,7 @@
           <a:p>
             <a:fld id="{519954A3-9DFD-4C44-94BA-B95130A3BA1C}" type="slidenum">
               <a:rPr lang="en-US" dirty="0"/>
-              <a:t>‹#›</a:t>
+              <a:t>‹Nr.›</a:t>
             </a:fld>
             <a:endParaRPr lang="en-US" dirty="0"/>
           </a:p>
@@ -11341,7 +11341,7 @@
             <a:fld id="{B61BEF0D-F0BB-DE4B-95CE-6DB70DBA9567}" type="datetimeFigureOut">
               <a:rPr lang="en-US" dirty="0"/>
               <a:pPr/>
-              <a:t>1/21/2019</a:t>
+              <a:t>1/22/2019</a:t>
             </a:fld>
             <a:endParaRPr lang="en-US" dirty="0"/>
           </a:p>
@@ -11384,7 +11384,7 @@
             <a:fld id="{D57F1E4F-1CFF-5643-939E-217C01CDF565}" type="slidenum">
               <a:rPr lang="en-US" dirty="0"/>
               <a:pPr/>
-              <a:t>‹#›</a:t>
+              <a:t>‹Nr.›</a:t>
             </a:fld>
             <a:endParaRPr lang="en-US" dirty="0"/>
           </a:p>
@@ -11581,7 +11581,7 @@
           <a:p>
             <a:fld id="{42A54C80-263E-416B-A8E0-580EDEADCBDC}" type="datetimeFigureOut">
               <a:rPr lang="en-US" dirty="0"/>
-              <a:t>1/21/2019</a:t>
+              <a:t>1/22/2019</a:t>
             </a:fld>
             <a:endParaRPr lang="en-US" dirty="0"/>
           </a:p>
@@ -11623,7 +11623,7 @@
           <a:p>
             <a:fld id="{519954A3-9DFD-4C44-94BA-B95130A3BA1C}" type="slidenum">
               <a:rPr lang="en-US" dirty="0"/>
-              <a:t>‹#›</a:t>
+              <a:t>‹Nr.›</a:t>
             </a:fld>
             <a:endParaRPr lang="en-US" dirty="0"/>
           </a:p>
@@ -11963,7 +11963,7 @@
             <a:fld id="{B61BEF0D-F0BB-DE4B-95CE-6DB70DBA9567}" type="datetimeFigureOut">
               <a:rPr lang="en-US" dirty="0"/>
               <a:pPr/>
-              <a:t>1/21/2019</a:t>
+              <a:t>1/22/2019</a:t>
             </a:fld>
             <a:endParaRPr lang="en-US" dirty="0"/>
           </a:p>
@@ -12006,7 +12006,7 @@
             <a:fld id="{D57F1E4F-1CFF-5643-939E-217C01CDF565}" type="slidenum">
               <a:rPr lang="en-US" dirty="0"/>
               <a:pPr/>
-              <a:t>‹#›</a:t>
+              <a:t>‹Nr.›</a:t>
             </a:fld>
             <a:endParaRPr lang="en-US" dirty="0"/>
           </a:p>
@@ -12095,7 +12095,7 @@
             <a:fld id="{B61BEF0D-F0BB-DE4B-95CE-6DB70DBA9567}" type="datetimeFigureOut">
               <a:rPr lang="en-US" dirty="0"/>
               <a:pPr/>
-              <a:t>1/21/2019</a:t>
+              <a:t>1/22/2019</a:t>
             </a:fld>
             <a:endParaRPr lang="en-US" dirty="0"/>
           </a:p>
@@ -12138,7 +12138,7 @@
             <a:fld id="{D57F1E4F-1CFF-5643-939E-217C01CDF565}" type="slidenum">
               <a:rPr lang="en-US" dirty="0"/>
               <a:pPr/>
-              <a:t>‹#›</a:t>
+              <a:t>‹Nr.›</a:t>
             </a:fld>
             <a:endParaRPr lang="en-US" dirty="0"/>
           </a:p>
@@ -12199,7 +12199,7 @@
             <a:fld id="{B61BEF0D-F0BB-DE4B-95CE-6DB70DBA9567}" type="datetimeFigureOut">
               <a:rPr lang="en-US" dirty="0"/>
               <a:pPr/>
-              <a:t>1/21/2019</a:t>
+              <a:t>1/22/2019</a:t>
             </a:fld>
             <a:endParaRPr lang="en-US" dirty="0"/>
           </a:p>
@@ -12242,7 +12242,7 @@
             <a:fld id="{D57F1E4F-1CFF-5643-939E-217C01CDF565}" type="slidenum">
               <a:rPr lang="en-US" dirty="0"/>
               <a:pPr/>
-              <a:t>‹#›</a:t>
+              <a:t>‹Nr.›</a:t>
             </a:fld>
             <a:endParaRPr lang="en-US" dirty="0"/>
           </a:p>
@@ -12462,7 +12462,7 @@
           <a:p>
             <a:fld id="{42A54C80-263E-416B-A8E0-580EDEADCBDC}" type="datetimeFigureOut">
               <a:rPr lang="en-US" dirty="0"/>
-              <a:t>1/21/2019</a:t>
+              <a:t>1/22/2019</a:t>
             </a:fld>
             <a:endParaRPr lang="en-US" dirty="0"/>
           </a:p>
@@ -12504,7 +12504,7 @@
           <a:p>
             <a:fld id="{519954A3-9DFD-4C44-94BA-B95130A3BA1C}" type="slidenum">
               <a:rPr lang="en-US" dirty="0"/>
-              <a:t>‹#›</a:t>
+              <a:t>‹Nr.›</a:t>
             </a:fld>
             <a:endParaRPr lang="en-US" dirty="0"/>
           </a:p>
@@ -12752,7 +12752,7 @@
             <a:fld id="{D57F1E4F-1CFF-5643-939E-217C01CDF565}" type="slidenum">
               <a:rPr lang="en-US" dirty="0"/>
               <a:pPr/>
-              <a:t>‹#›</a:t>
+              <a:t>‹Nr.›</a:t>
             </a:fld>
             <a:endParaRPr lang="en-US" dirty="0"/>
           </a:p>
@@ -12776,7 +12776,7 @@
             <a:fld id="{B61BEF0D-F0BB-DE4B-95CE-6DB70DBA9567}" type="datetimeFigureOut">
               <a:rPr lang="en-US" dirty="0"/>
               <a:pPr/>
-              <a:t>1/21/2019</a:t>
+              <a:t>1/22/2019</a:t>
             </a:fld>
             <a:endParaRPr lang="en-US" dirty="0"/>
           </a:p>
@@ -13486,7 +13486,7 @@
             <a:fld id="{B61BEF0D-F0BB-DE4B-95CE-6DB70DBA9567}" type="datetimeFigureOut">
               <a:rPr lang="en-US" dirty="0"/>
               <a:pPr/>
-              <a:t>1/21/2019</a:t>
+              <a:t>1/22/2019</a:t>
             </a:fld>
             <a:endParaRPr lang="en-US" dirty="0"/>
           </a:p>
@@ -13563,7 +13563,7 @@
             <a:fld id="{D57F1E4F-1CFF-5643-939E-217C01CDF565}" type="slidenum">
               <a:rPr lang="en-US" dirty="0"/>
               <a:pPr/>
-              <a:t>‹#›</a:t>
+              <a:t>‹Nr.›</a:t>
             </a:fld>
             <a:endParaRPr lang="en-US" dirty="0"/>
           </a:p>
@@ -14300,7 +14300,7 @@
           <p:nvPr>
             <p:extLst>
               <p:ext uri="{D42A27DB-BD31-4B8C-83A1-F6EECF244321}">
-                <p14:modId xmlns:p14="http://schemas.microsoft.com/office/powerpoint/2010/main" val="1757429658"/>
+                <p14:modId xmlns:p14="http://schemas.microsoft.com/office/powerpoint/2010/main" val="3337964891"/>
               </p:ext>
             </p:extLst>
           </p:nvPr>
@@ -15349,13 +15349,8 @@
           <a:p>
             <a:r>
               <a:rPr lang="de-AT" dirty="0"/>
-              <a:t>Verstärker: </a:t>
+              <a:t>Verstärker: Gesamtschaltung</a:t>
             </a:r>
-            <a:r>
-              <a:rPr lang="de-AT" dirty="0" err="1"/>
-              <a:t>Gesammtschaltung</a:t>
-            </a:r>
-            <a:endParaRPr lang="de-AT" dirty="0"/>
           </a:p>
         </p:txBody>
       </p:sp>
@@ -15487,7 +15482,7 @@
           <a:p>
             <a:r>
               <a:rPr lang="de-AT" dirty="0"/>
-              <a:t>250V DC in</a:t>
+              <a:t>280V DC in</a:t>
             </a:r>
           </a:p>
         </p:txBody>
@@ -15780,7 +15775,9 @@
         </p:nvSpPr>
         <p:spPr/>
         <p:txBody>
-          <a:bodyPr/>
+          <a:bodyPr>
+            <a:normAutofit fontScale="92500" lnSpcReduction="20000"/>
+          </a:bodyPr>
           <a:lstStyle/>
           <a:p>
             <a:r>
@@ -15827,6 +15824,40 @@
             <a:r>
               <a:rPr lang="de-AT" dirty="0"/>
               <a:t>Schaltplan des Netzteils</a:t>
+            </a:r>
+          </a:p>
+          <a:p>
+            <a:r>
+              <a:rPr lang="de-AT" dirty="0"/>
+              <a:t>Verstärker</a:t>
+            </a:r>
+          </a:p>
+          <a:p>
+            <a:pPr lvl="1"/>
+            <a:r>
+              <a:rPr lang="de-AT" dirty="0"/>
+              <a:t>Röhren kurz erklärt</a:t>
+            </a:r>
+          </a:p>
+          <a:p>
+            <a:pPr lvl="1"/>
+            <a:r>
+              <a:rPr lang="de-AT" dirty="0"/>
+              <a:t>Endstufe</a:t>
+            </a:r>
+          </a:p>
+          <a:p>
+            <a:pPr lvl="1"/>
+            <a:r>
+              <a:rPr lang="de-AT" dirty="0"/>
+              <a:t>Gesamtschaltung</a:t>
+            </a:r>
+          </a:p>
+          <a:p>
+            <a:pPr lvl="1"/>
+            <a:r>
+              <a:rPr lang="de-AT" dirty="0"/>
+              <a:t>Testaufbau</a:t>
             </a:r>
           </a:p>
         </p:txBody>
@@ -16610,6 +16641,80 @@
           </a:ln>
         </p:spPr>
       </p:pic>
+      <p:sp>
+        <p:nvSpPr>
+          <p:cNvPr id="4" name="Textfeld 3">
+            <a:extLst>
+              <a:ext uri="{FF2B5EF4-FFF2-40B4-BE49-F238E27FC236}">
+                <a16:creationId xmlns:a16="http://schemas.microsoft.com/office/drawing/2014/main" id="{B61B2F1A-B5A0-421C-831C-325570AE3A01}"/>
+              </a:ext>
+            </a:extLst>
+          </p:cNvPr>
+          <p:cNvSpPr txBox="1"/>
+          <p:nvPr/>
+        </p:nvSpPr>
+        <p:spPr>
+          <a:xfrm>
+            <a:off x="5939405" y="1852416"/>
+            <a:ext cx="956345" cy="338554"/>
+          </a:xfrm>
+          <a:prstGeom prst="rect">
+            <a:avLst/>
+          </a:prstGeom>
+          <a:solidFill>
+            <a:schemeClr val="bg1"/>
+          </a:solidFill>
+        </p:spPr>
+        <p:txBody>
+          <a:bodyPr wrap="square" rtlCol="0">
+            <a:spAutoFit/>
+          </a:bodyPr>
+          <a:lstStyle/>
+          <a:p>
+            <a:r>
+              <a:rPr lang="de-AT" sz="1600" dirty="0"/>
+              <a:t>280V DC</a:t>
+            </a:r>
+          </a:p>
+        </p:txBody>
+      </p:sp>
+      <p:sp>
+        <p:nvSpPr>
+          <p:cNvPr id="6" name="Textfeld 5">
+            <a:extLst>
+              <a:ext uri="{FF2B5EF4-FFF2-40B4-BE49-F238E27FC236}">
+                <a16:creationId xmlns:a16="http://schemas.microsoft.com/office/drawing/2014/main" id="{51A69236-348F-45C7-8B7C-5395A4B44B23}"/>
+              </a:ext>
+            </a:extLst>
+          </p:cNvPr>
+          <p:cNvSpPr txBox="1"/>
+          <p:nvPr/>
+        </p:nvSpPr>
+        <p:spPr>
+          <a:xfrm>
+            <a:off x="8317657" y="1854746"/>
+            <a:ext cx="956345" cy="338554"/>
+          </a:xfrm>
+          <a:prstGeom prst="rect">
+            <a:avLst/>
+          </a:prstGeom>
+          <a:solidFill>
+            <a:schemeClr val="bg1"/>
+          </a:solidFill>
+        </p:spPr>
+        <p:txBody>
+          <a:bodyPr wrap="square" rtlCol="0">
+            <a:spAutoFit/>
+          </a:bodyPr>
+          <a:lstStyle/>
+          <a:p>
+            <a:r>
+              <a:rPr lang="de-AT" sz="1600" dirty="0"/>
+              <a:t>280V DC</a:t>
+            </a:r>
+          </a:p>
+        </p:txBody>
+      </p:sp>
     </p:spTree>
     <p:extLst>
       <p:ext uri="{BB962C8B-B14F-4D97-AF65-F5344CB8AC3E}">
@@ -16632,6 +16737,204 @@
       </p:transition>
     </mc:Fallback>
   </mc:AlternateContent>
+  <p:timing>
+    <p:tnLst>
+      <p:par>
+        <p:cTn id="1" dur="indefinite" restart="never" nodeType="tmRoot">
+          <p:childTnLst>
+            <p:seq concurrent="1" nextAc="seek">
+              <p:cTn id="2" dur="indefinite" nodeType="mainSeq">
+                <p:childTnLst>
+                  <p:par>
+                    <p:cTn id="3" fill="hold">
+                      <p:stCondLst>
+                        <p:cond delay="indefinite"/>
+                      </p:stCondLst>
+                      <p:childTnLst>
+                        <p:par>
+                          <p:cTn id="4" fill="hold">
+                            <p:stCondLst>
+                              <p:cond delay="0"/>
+                            </p:stCondLst>
+                            <p:childTnLst>
+                              <p:par>
+                                <p:cTn id="5" presetID="2" presetClass="entr" presetSubtype="4" fill="hold" grpId="0" nodeType="clickEffect">
+                                  <p:stCondLst>
+                                    <p:cond delay="0"/>
+                                  </p:stCondLst>
+                                  <p:childTnLst>
+                                    <p:set>
+                                      <p:cBhvr>
+                                        <p:cTn id="6" dur="1" fill="hold">
+                                          <p:stCondLst>
+                                            <p:cond delay="0"/>
+                                          </p:stCondLst>
+                                        </p:cTn>
+                                        <p:tgtEl>
+                                          <p:spTgt spid="4"/>
+                                        </p:tgtEl>
+                                        <p:attrNameLst>
+                                          <p:attrName>style.visibility</p:attrName>
+                                        </p:attrNameLst>
+                                      </p:cBhvr>
+                                      <p:to>
+                                        <p:strVal val="visible"/>
+                                      </p:to>
+                                    </p:set>
+                                    <p:anim calcmode="lin" valueType="num">
+                                      <p:cBhvr additive="base">
+                                        <p:cTn id="7" dur="500" fill="hold"/>
+                                        <p:tgtEl>
+                                          <p:spTgt spid="4"/>
+                                        </p:tgtEl>
+                                        <p:attrNameLst>
+                                          <p:attrName>ppt_x</p:attrName>
+                                        </p:attrNameLst>
+                                      </p:cBhvr>
+                                      <p:tavLst>
+                                        <p:tav tm="0">
+                                          <p:val>
+                                            <p:strVal val="#ppt_x"/>
+                                          </p:val>
+                                        </p:tav>
+                                        <p:tav tm="100000">
+                                          <p:val>
+                                            <p:strVal val="#ppt_x"/>
+                                          </p:val>
+                                        </p:tav>
+                                      </p:tavLst>
+                                    </p:anim>
+                                    <p:anim calcmode="lin" valueType="num">
+                                      <p:cBhvr additive="base">
+                                        <p:cTn id="8" dur="500" fill="hold"/>
+                                        <p:tgtEl>
+                                          <p:spTgt spid="4"/>
+                                        </p:tgtEl>
+                                        <p:attrNameLst>
+                                          <p:attrName>ppt_y</p:attrName>
+                                        </p:attrNameLst>
+                                      </p:cBhvr>
+                                      <p:tavLst>
+                                        <p:tav tm="0">
+                                          <p:val>
+                                            <p:strVal val="1+#ppt_h/2"/>
+                                          </p:val>
+                                        </p:tav>
+                                        <p:tav tm="100000">
+                                          <p:val>
+                                            <p:strVal val="#ppt_y"/>
+                                          </p:val>
+                                        </p:tav>
+                                      </p:tavLst>
+                                    </p:anim>
+                                  </p:childTnLst>
+                                </p:cTn>
+                              </p:par>
+                              <p:par>
+                                <p:cTn id="9" presetID="2" presetClass="entr" presetSubtype="4" fill="hold" grpId="0" nodeType="withEffect">
+                                  <p:stCondLst>
+                                    <p:cond delay="0"/>
+                                  </p:stCondLst>
+                                  <p:childTnLst>
+                                    <p:set>
+                                      <p:cBhvr>
+                                        <p:cTn id="10" dur="1" fill="hold">
+                                          <p:stCondLst>
+                                            <p:cond delay="0"/>
+                                          </p:stCondLst>
+                                        </p:cTn>
+                                        <p:tgtEl>
+                                          <p:spTgt spid="6"/>
+                                        </p:tgtEl>
+                                        <p:attrNameLst>
+                                          <p:attrName>style.visibility</p:attrName>
+                                        </p:attrNameLst>
+                                      </p:cBhvr>
+                                      <p:to>
+                                        <p:strVal val="visible"/>
+                                      </p:to>
+                                    </p:set>
+                                    <p:anim calcmode="lin" valueType="num">
+                                      <p:cBhvr additive="base">
+                                        <p:cTn id="11" dur="500" fill="hold"/>
+                                        <p:tgtEl>
+                                          <p:spTgt spid="6"/>
+                                        </p:tgtEl>
+                                        <p:attrNameLst>
+                                          <p:attrName>ppt_x</p:attrName>
+                                        </p:attrNameLst>
+                                      </p:cBhvr>
+                                      <p:tavLst>
+                                        <p:tav tm="0">
+                                          <p:val>
+                                            <p:strVal val="#ppt_x"/>
+                                          </p:val>
+                                        </p:tav>
+                                        <p:tav tm="100000">
+                                          <p:val>
+                                            <p:strVal val="#ppt_x"/>
+                                          </p:val>
+                                        </p:tav>
+                                      </p:tavLst>
+                                    </p:anim>
+                                    <p:anim calcmode="lin" valueType="num">
+                                      <p:cBhvr additive="base">
+                                        <p:cTn id="12" dur="500" fill="hold"/>
+                                        <p:tgtEl>
+                                          <p:spTgt spid="6"/>
+                                        </p:tgtEl>
+                                        <p:attrNameLst>
+                                          <p:attrName>ppt_y</p:attrName>
+                                        </p:attrNameLst>
+                                      </p:cBhvr>
+                                      <p:tavLst>
+                                        <p:tav tm="0">
+                                          <p:val>
+                                            <p:strVal val="1+#ppt_h/2"/>
+                                          </p:val>
+                                        </p:tav>
+                                        <p:tav tm="100000">
+                                          <p:val>
+                                            <p:strVal val="#ppt_y"/>
+                                          </p:val>
+                                        </p:tav>
+                                      </p:tavLst>
+                                    </p:anim>
+                                  </p:childTnLst>
+                                </p:cTn>
+                              </p:par>
+                            </p:childTnLst>
+                          </p:cTn>
+                        </p:par>
+                      </p:childTnLst>
+                    </p:cTn>
+                  </p:par>
+                </p:childTnLst>
+              </p:cTn>
+              <p:prevCondLst>
+                <p:cond evt="onPrev" delay="0">
+                  <p:tgtEl>
+                    <p:sldTgt/>
+                  </p:tgtEl>
+                </p:cond>
+              </p:prevCondLst>
+              <p:nextCondLst>
+                <p:cond evt="onNext" delay="0">
+                  <p:tgtEl>
+                    <p:sldTgt/>
+                  </p:tgtEl>
+                </p:cond>
+              </p:nextCondLst>
+            </p:seq>
+          </p:childTnLst>
+        </p:cTn>
+      </p:par>
+    </p:tnLst>
+    <p:bldLst>
+      <p:bldP spid="4" grpId="0" animBg="1"/>
+      <p:bldP spid="6" grpId="0" animBg="1"/>
+    </p:bldLst>
+  </p:timing>
 </p:sld>
 </file>
 
@@ -20223,6 +20526,218 @@
       </p:transition>
     </mc:Fallback>
   </mc:AlternateContent>
+  <p:timing>
+    <p:tnLst>
+      <p:par>
+        <p:cTn id="1" dur="indefinite" restart="never" nodeType="tmRoot">
+          <p:childTnLst>
+            <p:seq concurrent="1" nextAc="seek">
+              <p:cTn id="2" dur="indefinite" nodeType="mainSeq">
+                <p:childTnLst>
+                  <p:par>
+                    <p:cTn id="3" fill="hold">
+                      <p:stCondLst>
+                        <p:cond delay="indefinite"/>
+                      </p:stCondLst>
+                      <p:childTnLst>
+                        <p:par>
+                          <p:cTn id="4" fill="hold">
+                            <p:stCondLst>
+                              <p:cond delay="0"/>
+                            </p:stCondLst>
+                            <p:childTnLst>
+                              <p:par>
+                                <p:cTn id="5" presetID="2" presetClass="entr" presetSubtype="4" fill="hold" nodeType="clickEffect">
+                                  <p:stCondLst>
+                                    <p:cond delay="0"/>
+                                  </p:stCondLst>
+                                  <p:childTnLst>
+                                    <p:set>
+                                      <p:cBhvr>
+                                        <p:cTn id="6" dur="1" fill="hold">
+                                          <p:stCondLst>
+                                            <p:cond delay="0"/>
+                                          </p:stCondLst>
+                                        </p:cTn>
+                                        <p:tgtEl>
+                                          <p:spTgt spid="6"/>
+                                        </p:tgtEl>
+                                        <p:attrNameLst>
+                                          <p:attrName>style.visibility</p:attrName>
+                                        </p:attrNameLst>
+                                      </p:cBhvr>
+                                      <p:to>
+                                        <p:strVal val="visible"/>
+                                      </p:to>
+                                    </p:set>
+                                    <p:anim calcmode="lin" valueType="num">
+                                      <p:cBhvr additive="base">
+                                        <p:cTn id="7" dur="500" fill="hold"/>
+                                        <p:tgtEl>
+                                          <p:spTgt spid="6"/>
+                                        </p:tgtEl>
+                                        <p:attrNameLst>
+                                          <p:attrName>ppt_x</p:attrName>
+                                        </p:attrNameLst>
+                                      </p:cBhvr>
+                                      <p:tavLst>
+                                        <p:tav tm="0">
+                                          <p:val>
+                                            <p:strVal val="#ppt_x"/>
+                                          </p:val>
+                                        </p:tav>
+                                        <p:tav tm="100000">
+                                          <p:val>
+                                            <p:strVal val="#ppt_x"/>
+                                          </p:val>
+                                        </p:tav>
+                                      </p:tavLst>
+                                    </p:anim>
+                                    <p:anim calcmode="lin" valueType="num">
+                                      <p:cBhvr additive="base">
+                                        <p:cTn id="8" dur="500" fill="hold"/>
+                                        <p:tgtEl>
+                                          <p:spTgt spid="6"/>
+                                        </p:tgtEl>
+                                        <p:attrNameLst>
+                                          <p:attrName>ppt_y</p:attrName>
+                                        </p:attrNameLst>
+                                      </p:cBhvr>
+                                      <p:tavLst>
+                                        <p:tav tm="0">
+                                          <p:val>
+                                            <p:strVal val="1+#ppt_h/2"/>
+                                          </p:val>
+                                        </p:tav>
+                                        <p:tav tm="100000">
+                                          <p:val>
+                                            <p:strVal val="#ppt_y"/>
+                                          </p:val>
+                                        </p:tav>
+                                      </p:tavLst>
+                                    </p:anim>
+                                  </p:childTnLst>
+                                </p:cTn>
+                              </p:par>
+                            </p:childTnLst>
+                          </p:cTn>
+                        </p:par>
+                      </p:childTnLst>
+                    </p:cTn>
+                  </p:par>
+                  <p:par>
+                    <p:cTn id="9" fill="hold">
+                      <p:stCondLst>
+                        <p:cond delay="indefinite"/>
+                      </p:stCondLst>
+                      <p:childTnLst>
+                        <p:par>
+                          <p:cTn id="10" fill="hold">
+                            <p:stCondLst>
+                              <p:cond delay="0"/>
+                            </p:stCondLst>
+                            <p:childTnLst>
+                              <p:par>
+                                <p:cTn id="11" presetID="2" presetClass="entr" presetSubtype="4" fill="hold" nodeType="clickEffect">
+                                  <p:stCondLst>
+                                    <p:cond delay="0"/>
+                                  </p:stCondLst>
+                                  <p:childTnLst>
+                                    <p:set>
+                                      <p:cBhvr>
+                                        <p:cTn id="12" dur="1" fill="hold">
+                                          <p:stCondLst>
+                                            <p:cond delay="0"/>
+                                          </p:stCondLst>
+                                        </p:cTn>
+                                        <p:tgtEl>
+                                          <p:spTgt spid="5"/>
+                                        </p:tgtEl>
+                                        <p:attrNameLst>
+                                          <p:attrName>style.visibility</p:attrName>
+                                        </p:attrNameLst>
+                                      </p:cBhvr>
+                                      <p:to>
+                                        <p:strVal val="visible"/>
+                                      </p:to>
+                                    </p:set>
+                                    <p:anim calcmode="lin" valueType="num">
+                                      <p:cBhvr additive="base">
+                                        <p:cTn id="13" dur="500" fill="hold"/>
+                                        <p:tgtEl>
+                                          <p:spTgt spid="5"/>
+                                        </p:tgtEl>
+                                        <p:attrNameLst>
+                                          <p:attrName>ppt_x</p:attrName>
+                                        </p:attrNameLst>
+                                      </p:cBhvr>
+                                      <p:tavLst>
+                                        <p:tav tm="0">
+                                          <p:val>
+                                            <p:strVal val="#ppt_x"/>
+                                          </p:val>
+                                        </p:tav>
+                                        <p:tav tm="100000">
+                                          <p:val>
+                                            <p:strVal val="#ppt_x"/>
+                                          </p:val>
+                                        </p:tav>
+                                      </p:tavLst>
+                                    </p:anim>
+                                    <p:anim calcmode="lin" valueType="num">
+                                      <p:cBhvr additive="base">
+                                        <p:cTn id="14" dur="500" fill="hold"/>
+                                        <p:tgtEl>
+                                          <p:spTgt spid="5"/>
+                                        </p:tgtEl>
+                                        <p:attrNameLst>
+                                          <p:attrName>ppt_y</p:attrName>
+                                        </p:attrNameLst>
+                                      </p:cBhvr>
+                                      <p:tavLst>
+                                        <p:tav tm="0">
+                                          <p:val>
+                                            <p:strVal val="1+#ppt_h/2"/>
+                                          </p:val>
+                                        </p:tav>
+                                        <p:tav tm="100000">
+                                          <p:val>
+                                            <p:strVal val="#ppt_y"/>
+                                          </p:val>
+                                        </p:tav>
+                                      </p:tavLst>
+                                    </p:anim>
+                                  </p:childTnLst>
+                                </p:cTn>
+                              </p:par>
+                            </p:childTnLst>
+                          </p:cTn>
+                        </p:par>
+                      </p:childTnLst>
+                    </p:cTn>
+                  </p:par>
+                </p:childTnLst>
+              </p:cTn>
+              <p:prevCondLst>
+                <p:cond evt="onPrev" delay="0">
+                  <p:tgtEl>
+                    <p:sldTgt/>
+                  </p:tgtEl>
+                </p:cond>
+              </p:prevCondLst>
+              <p:nextCondLst>
+                <p:cond evt="onNext" delay="0">
+                  <p:tgtEl>
+                    <p:sldTgt/>
+                  </p:tgtEl>
+                </p:cond>
+              </p:nextCondLst>
+            </p:seq>
+          </p:childTnLst>
+        </p:cTn>
+      </p:par>
+    </p:tnLst>
+  </p:timing>
 </p:sld>
 </file>
 

</xml_diff>